<commit_message>
Presentaton 1st and 2nd deliverable
</commit_message>
<xml_diff>
--- a/Documentation/Software Architecture.pptx
+++ b/Documentation/Software Architecture.pptx
@@ -5,10 +5,10 @@
     <p:sldMasterId id="2147483708" r:id="rId2"/>
   </p:sldMasterIdLst>
   <p:notesMasterIdLst>
-    <p:notesMasterId r:id="rId18"/>
+    <p:notesMasterId r:id="rId24"/>
   </p:notesMasterIdLst>
   <p:handoutMasterIdLst>
-    <p:handoutMasterId r:id="rId19"/>
+    <p:handoutMasterId r:id="rId25"/>
   </p:handoutMasterIdLst>
   <p:sldIdLst>
     <p:sldId id="257" r:id="rId3"/>
@@ -21,11 +21,17 @@
     <p:sldId id="276" r:id="rId10"/>
     <p:sldId id="279" r:id="rId11"/>
     <p:sldId id="282" r:id="rId12"/>
-    <p:sldId id="273" r:id="rId13"/>
-    <p:sldId id="262" r:id="rId14"/>
-    <p:sldId id="263" r:id="rId15"/>
-    <p:sldId id="271" r:id="rId16"/>
-    <p:sldId id="265" r:id="rId17"/>
+    <p:sldId id="284" r:id="rId13"/>
+    <p:sldId id="285" r:id="rId14"/>
+    <p:sldId id="283" r:id="rId15"/>
+    <p:sldId id="286" r:id="rId16"/>
+    <p:sldId id="287" r:id="rId17"/>
+    <p:sldId id="288" r:id="rId18"/>
+    <p:sldId id="273" r:id="rId19"/>
+    <p:sldId id="262" r:id="rId20"/>
+    <p:sldId id="263" r:id="rId21"/>
+    <p:sldId id="271" r:id="rId22"/>
+    <p:sldId id="265" r:id="rId23"/>
   </p:sldIdLst>
   <p:sldSz cx="12188825" cy="6858000"/>
   <p:notesSz cx="6858000" cy="9144000"/>
@@ -125,6 +131,35 @@
     </a:lvl9pPr>
   </p:defaultTextStyle>
   <p:extLst>
+    <p:ext uri="{521415D9-36F7-43E2-AB2F-B90AF26B5E84}">
+      <p14:sectionLst xmlns:p14="http://schemas.microsoft.com/office/powerpoint/2010/main">
+        <p14:section name="Sección predeterminada" id="{81D7756F-A866-43A8-A83E-242B919C41DB}">
+          <p14:sldIdLst>
+            <p14:sldId id="257"/>
+            <p14:sldId id="281"/>
+            <p14:sldId id="280"/>
+            <p14:sldId id="272"/>
+            <p14:sldId id="261"/>
+            <p14:sldId id="275"/>
+            <p14:sldId id="277"/>
+            <p14:sldId id="276"/>
+            <p14:sldId id="279"/>
+            <p14:sldId id="282"/>
+            <p14:sldId id="284"/>
+            <p14:sldId id="285"/>
+            <p14:sldId id="283"/>
+            <p14:sldId id="286"/>
+            <p14:sldId id="287"/>
+            <p14:sldId id="288"/>
+            <p14:sldId id="273"/>
+            <p14:sldId id="262"/>
+            <p14:sldId id="263"/>
+            <p14:sldId id="271"/>
+            <p14:sldId id="265"/>
+          </p14:sldIdLst>
+        </p14:section>
+      </p14:sectionLst>
+    </p:ext>
     <p:ext uri="{EFAFB233-063F-42B5-8137-9DF3F51BA10A}">
       <p15:sldGuideLst xmlns:p15="http://schemas.microsoft.com/office/powerpoint/2012/main">
         <p15:guide id="1" orient="horz" pos="2160">
@@ -1411,6 +1446,680 @@
     <p:extLst>
       <p:ext uri="{BB962C8B-B14F-4D97-AF65-F5344CB8AC3E}">
         <p14:creationId xmlns:p14="http://schemas.microsoft.com/office/powerpoint/2010/main" val="3314713159"/>
+      </p:ext>
+    </p:extLst>
+  </p:cSld>
+  <p:clrMapOvr>
+    <a:masterClrMapping/>
+  </p:clrMapOvr>
+</p:notes>
+</file>
+
+<file path=ppt/notesSlides/notesSlide4.xml><?xml version="1.0" encoding="utf-8"?>
+<p:notes xmlns:a="http://schemas.openxmlformats.org/drawingml/2006/main" xmlns:r="http://schemas.openxmlformats.org/officeDocument/2006/relationships" xmlns:p="http://schemas.openxmlformats.org/presentationml/2006/main">
+  <p:cSld>
+    <p:spTree>
+      <p:nvGrpSpPr>
+        <p:cNvPr id="1" name=""/>
+        <p:cNvGrpSpPr/>
+        <p:nvPr/>
+      </p:nvGrpSpPr>
+      <p:grpSpPr>
+        <a:xfrm>
+          <a:off x="0" y="0"/>
+          <a:ext cx="0" cy="0"/>
+          <a:chOff x="0" y="0"/>
+          <a:chExt cx="0" cy="0"/>
+        </a:xfrm>
+      </p:grpSpPr>
+      <p:sp>
+        <p:nvSpPr>
+          <p:cNvPr id="2" name="Marcador de imagen de diapositiva 1"/>
+          <p:cNvSpPr>
+            <a:spLocks noGrp="1" noRot="1" noChangeAspect="1"/>
+          </p:cNvSpPr>
+          <p:nvPr>
+            <p:ph type="sldImg"/>
+          </p:nvPr>
+        </p:nvSpPr>
+        <p:spPr/>
+      </p:sp>
+      <p:sp>
+        <p:nvSpPr>
+          <p:cNvPr id="3" name="Marcador de notas 2"/>
+          <p:cNvSpPr>
+            <a:spLocks noGrp="1"/>
+          </p:cNvSpPr>
+          <p:nvPr>
+            <p:ph type="body" idx="1"/>
+          </p:nvPr>
+        </p:nvSpPr>
+        <p:spPr/>
+        <p:txBody>
+          <a:bodyPr/>
+          <a:lstStyle/>
+          <a:p>
+            <a:r>
+              <a:rPr lang="en-GB" noProof="0" dirty="0" smtClean="0"/>
+              <a:t>Explain: This</a:t>
+            </a:r>
+            <a:r>
+              <a:rPr lang="en-GB" baseline="0" noProof="0" dirty="0" smtClean="0"/>
+              <a:t> second deliverable its a desktop application to play Trivial. The principal restrictions are that the users have to be registered to play and the admin has access to all the statistics of the games and users. </a:t>
+            </a:r>
+            <a:endParaRPr lang="en-GB" noProof="0" dirty="0"/>
+          </a:p>
+        </p:txBody>
+      </p:sp>
+      <p:sp>
+        <p:nvSpPr>
+          <p:cNvPr id="4" name="Marcador de número de diapositiva 3"/>
+          <p:cNvSpPr>
+            <a:spLocks noGrp="1"/>
+          </p:cNvSpPr>
+          <p:nvPr>
+            <p:ph type="sldNum" sz="quarter" idx="10"/>
+          </p:nvPr>
+        </p:nvSpPr>
+        <p:spPr/>
+        <p:txBody>
+          <a:bodyPr/>
+          <a:lstStyle/>
+          <a:p>
+            <a:fld id="{3EBA5BD7-F043-4D1B-AA17-CD412FC534DE}" type="slidenum">
+              <a:rPr lang="es-ES" smtClean="0"/>
+              <a:t>11</a:t>
+            </a:fld>
+            <a:endParaRPr lang="es-ES"/>
+          </a:p>
+        </p:txBody>
+      </p:sp>
+    </p:spTree>
+    <p:extLst>
+      <p:ext uri="{BB962C8B-B14F-4D97-AF65-F5344CB8AC3E}">
+        <p14:creationId xmlns:p14="http://schemas.microsoft.com/office/powerpoint/2010/main" val="3184010729"/>
+      </p:ext>
+    </p:extLst>
+  </p:cSld>
+  <p:clrMapOvr>
+    <a:masterClrMapping/>
+  </p:clrMapOvr>
+</p:notes>
+</file>
+
+<file path=ppt/notesSlides/notesSlide5.xml><?xml version="1.0" encoding="utf-8"?>
+<p:notes xmlns:a="http://schemas.openxmlformats.org/drawingml/2006/main" xmlns:r="http://schemas.openxmlformats.org/officeDocument/2006/relationships" xmlns:p="http://schemas.openxmlformats.org/presentationml/2006/main">
+  <p:cSld>
+    <p:spTree>
+      <p:nvGrpSpPr>
+        <p:cNvPr id="1" name=""/>
+        <p:cNvGrpSpPr/>
+        <p:nvPr/>
+      </p:nvGrpSpPr>
+      <p:grpSpPr>
+        <a:xfrm>
+          <a:off x="0" y="0"/>
+          <a:ext cx="0" cy="0"/>
+          <a:chOff x="0" y="0"/>
+          <a:chExt cx="0" cy="0"/>
+        </a:xfrm>
+      </p:grpSpPr>
+      <p:sp>
+        <p:nvSpPr>
+          <p:cNvPr id="2" name="Marcador de imagen de diapositiva 1"/>
+          <p:cNvSpPr>
+            <a:spLocks noGrp="1" noRot="1" noChangeAspect="1"/>
+          </p:cNvSpPr>
+          <p:nvPr>
+            <p:ph type="sldImg"/>
+          </p:nvPr>
+        </p:nvSpPr>
+        <p:spPr/>
+      </p:sp>
+      <p:sp>
+        <p:nvSpPr>
+          <p:cNvPr id="3" name="Marcador de notas 2"/>
+          <p:cNvSpPr>
+            <a:spLocks noGrp="1"/>
+          </p:cNvSpPr>
+          <p:nvPr>
+            <p:ph type="body" idx="1"/>
+          </p:nvPr>
+        </p:nvSpPr>
+        <p:spPr/>
+        <p:txBody>
+          <a:bodyPr/>
+          <a:lstStyle/>
+          <a:p>
+            <a:r>
+              <a:rPr lang="en-US" dirty="0" smtClean="0"/>
+              <a:t>In this deliverable we fulfil the approach of a MVC. There are three main different parts. </a:t>
+            </a:r>
+          </a:p>
+          <a:p>
+            <a:r>
+              <a:rPr lang="en-US" dirty="0" smtClean="0"/>
+              <a:t>The model that contains the business logic and the records the status. It's independent from the status and the different views. </a:t>
+            </a:r>
+          </a:p>
+          <a:p>
+            <a:r>
+              <a:rPr lang="en-US" dirty="0" smtClean="0"/>
+              <a:t>The controller which is </a:t>
+            </a:r>
+            <a:r>
+              <a:rPr lang="en-US" dirty="0" err="1" smtClean="0"/>
+              <a:t>encharge</a:t>
+            </a:r>
+            <a:r>
+              <a:rPr lang="en-US" dirty="0" smtClean="0"/>
+              <a:t> of processing the events of the players and the proper actions. </a:t>
+            </a:r>
+          </a:p>
+          <a:p>
+            <a:r>
+              <a:rPr lang="en-US" dirty="0" smtClean="0"/>
+              <a:t>And the last one the views that are showing the contents of the model. </a:t>
+            </a:r>
+            <a:endParaRPr lang="es-ES" dirty="0"/>
+          </a:p>
+        </p:txBody>
+      </p:sp>
+      <p:sp>
+        <p:nvSpPr>
+          <p:cNvPr id="4" name="Marcador de número de diapositiva 3"/>
+          <p:cNvSpPr>
+            <a:spLocks noGrp="1"/>
+          </p:cNvSpPr>
+          <p:nvPr>
+            <p:ph type="sldNum" sz="quarter" idx="10"/>
+          </p:nvPr>
+        </p:nvSpPr>
+        <p:spPr/>
+        <p:txBody>
+          <a:bodyPr/>
+          <a:lstStyle/>
+          <a:p>
+            <a:fld id="{3EBA5BD7-F043-4D1B-AA17-CD412FC534DE}" type="slidenum">
+              <a:rPr lang="es-ES" smtClean="0"/>
+              <a:t>12</a:t>
+            </a:fld>
+            <a:endParaRPr lang="es-ES"/>
+          </a:p>
+        </p:txBody>
+      </p:sp>
+    </p:spTree>
+    <p:extLst>
+      <p:ext uri="{BB962C8B-B14F-4D97-AF65-F5344CB8AC3E}">
+        <p14:creationId xmlns:p14="http://schemas.microsoft.com/office/powerpoint/2010/main" val="332245227"/>
+      </p:ext>
+    </p:extLst>
+  </p:cSld>
+  <p:clrMapOvr>
+    <a:masterClrMapping/>
+  </p:clrMapOvr>
+</p:notes>
+</file>
+
+<file path=ppt/notesSlides/notesSlide6.xml><?xml version="1.0" encoding="utf-8"?>
+<p:notes xmlns:a="http://schemas.openxmlformats.org/drawingml/2006/main" xmlns:r="http://schemas.openxmlformats.org/officeDocument/2006/relationships" xmlns:p="http://schemas.openxmlformats.org/presentationml/2006/main">
+  <p:cSld>
+    <p:spTree>
+      <p:nvGrpSpPr>
+        <p:cNvPr id="1" name=""/>
+        <p:cNvGrpSpPr/>
+        <p:nvPr/>
+      </p:nvGrpSpPr>
+      <p:grpSpPr>
+        <a:xfrm>
+          <a:off x="0" y="0"/>
+          <a:ext cx="0" cy="0"/>
+          <a:chOff x="0" y="0"/>
+          <a:chExt cx="0" cy="0"/>
+        </a:xfrm>
+      </p:grpSpPr>
+      <p:sp>
+        <p:nvSpPr>
+          <p:cNvPr id="2" name="Marcador de imagen de diapositiva 1"/>
+          <p:cNvSpPr>
+            <a:spLocks noGrp="1" noRot="1" noChangeAspect="1"/>
+          </p:cNvSpPr>
+          <p:nvPr>
+            <p:ph type="sldImg"/>
+          </p:nvPr>
+        </p:nvSpPr>
+        <p:spPr/>
+      </p:sp>
+      <p:sp>
+        <p:nvSpPr>
+          <p:cNvPr id="3" name="Marcador de notas 2"/>
+          <p:cNvSpPr>
+            <a:spLocks noGrp="1"/>
+          </p:cNvSpPr>
+          <p:nvPr>
+            <p:ph type="body" idx="1"/>
+          </p:nvPr>
+        </p:nvSpPr>
+        <p:spPr/>
+        <p:txBody>
+          <a:bodyPr/>
+          <a:lstStyle/>
+          <a:p>
+            <a:r>
+              <a:rPr lang="es-ES" dirty="0" smtClean="0"/>
+              <a:t>In </a:t>
+            </a:r>
+            <a:r>
+              <a:rPr lang="es-ES" dirty="0" err="1" smtClean="0"/>
+              <a:t>our</a:t>
+            </a:r>
+            <a:r>
+              <a:rPr lang="es-ES" dirty="0" smtClean="0"/>
+              <a:t> case, </a:t>
+            </a:r>
+            <a:r>
+              <a:rPr lang="es-ES" dirty="0" err="1" smtClean="0"/>
+              <a:t>this</a:t>
+            </a:r>
+            <a:r>
+              <a:rPr lang="es-ES" baseline="0" dirty="0" smtClean="0"/>
+              <a:t> </a:t>
+            </a:r>
+            <a:r>
+              <a:rPr lang="es-ES" baseline="0" dirty="0" err="1" smtClean="0"/>
+              <a:t>is</a:t>
+            </a:r>
+            <a:r>
+              <a:rPr lang="es-ES" baseline="0" dirty="0" smtClean="0"/>
+              <a:t> </a:t>
+            </a:r>
+            <a:r>
+              <a:rPr lang="es-ES" baseline="0" dirty="0" err="1" smtClean="0"/>
+              <a:t>the</a:t>
+            </a:r>
+            <a:r>
+              <a:rPr lang="es-ES" baseline="0" dirty="0" smtClean="0"/>
+              <a:t> </a:t>
+            </a:r>
+            <a:r>
+              <a:rPr lang="es-ES" baseline="0" dirty="0" err="1" smtClean="0"/>
+              <a:t>application</a:t>
+            </a:r>
+            <a:r>
+              <a:rPr lang="es-ES" baseline="0" dirty="0" smtClean="0"/>
+              <a:t> of </a:t>
+            </a:r>
+            <a:r>
+              <a:rPr lang="es-ES" baseline="0" dirty="0" err="1" smtClean="0"/>
+              <a:t>the</a:t>
+            </a:r>
+            <a:r>
+              <a:rPr lang="es-ES" baseline="0" dirty="0" smtClean="0"/>
+              <a:t> MVC. </a:t>
+            </a:r>
+            <a:r>
+              <a:rPr lang="es-ES" baseline="0" dirty="0" err="1" smtClean="0"/>
+              <a:t>We</a:t>
+            </a:r>
+            <a:r>
+              <a:rPr lang="es-ES" baseline="0" dirty="0" smtClean="0"/>
+              <a:t> </a:t>
+            </a:r>
+            <a:r>
+              <a:rPr lang="es-ES" baseline="0" dirty="0" err="1" smtClean="0"/>
+              <a:t>have</a:t>
+            </a:r>
+            <a:r>
+              <a:rPr lang="es-ES" baseline="0" dirty="0" smtClean="0"/>
+              <a:t> </a:t>
+            </a:r>
+            <a:r>
+              <a:rPr lang="es-ES" baseline="0" dirty="0" err="1" smtClean="0"/>
+              <a:t>there</a:t>
+            </a:r>
+            <a:r>
+              <a:rPr lang="es-ES" baseline="0" dirty="0" smtClean="0"/>
+              <a:t> </a:t>
+            </a:r>
+            <a:r>
+              <a:rPr lang="es-ES" baseline="0" dirty="0" err="1" smtClean="0"/>
+              <a:t>diferenciated</a:t>
+            </a:r>
+            <a:r>
+              <a:rPr lang="es-ES" baseline="0" dirty="0" smtClean="0"/>
+              <a:t> modules. </a:t>
+            </a:r>
+            <a:r>
+              <a:rPr lang="es-ES" baseline="0" dirty="0" err="1" smtClean="0"/>
+              <a:t>The</a:t>
+            </a:r>
+            <a:r>
+              <a:rPr lang="es-ES" baseline="0" dirty="0" smtClean="0"/>
+              <a:t> </a:t>
+            </a:r>
+            <a:r>
+              <a:rPr lang="es-ES" baseline="0" dirty="0" err="1" smtClean="0"/>
+              <a:t>Persistence</a:t>
+            </a:r>
+            <a:r>
+              <a:rPr lang="es-ES" baseline="0" dirty="0" smtClean="0"/>
+              <a:t> </a:t>
+            </a:r>
+            <a:r>
+              <a:rPr lang="es-ES" baseline="0" dirty="0" err="1" smtClean="0"/>
+              <a:t>with</a:t>
+            </a:r>
+            <a:r>
+              <a:rPr lang="es-ES" baseline="0" dirty="0" smtClean="0"/>
+              <a:t> </a:t>
+            </a:r>
+            <a:r>
+              <a:rPr lang="es-ES" baseline="0" dirty="0" err="1" smtClean="0"/>
+              <a:t>the</a:t>
+            </a:r>
+            <a:r>
+              <a:rPr lang="es-ES" baseline="0" dirty="0" smtClean="0"/>
+              <a:t> </a:t>
+            </a:r>
+            <a:r>
+              <a:rPr lang="es-ES" baseline="0" dirty="0" err="1" smtClean="0"/>
+              <a:t>coneccions</a:t>
+            </a:r>
+            <a:r>
+              <a:rPr lang="es-ES" baseline="0" dirty="0" smtClean="0"/>
+              <a:t> to Mondo DB, </a:t>
+            </a:r>
+            <a:r>
+              <a:rPr lang="es-ES" baseline="0" dirty="0" err="1" smtClean="0"/>
+              <a:t>here</a:t>
+            </a:r>
+            <a:r>
+              <a:rPr lang="es-ES" baseline="0" dirty="0" smtClean="0"/>
+              <a:t> </a:t>
+            </a:r>
+            <a:r>
+              <a:rPr lang="es-ES" baseline="0" dirty="0" err="1" smtClean="0"/>
+              <a:t>it’s</a:t>
+            </a:r>
+            <a:r>
+              <a:rPr lang="es-ES" baseline="0" dirty="0" smtClean="0"/>
+              <a:t> </a:t>
+            </a:r>
+            <a:r>
+              <a:rPr lang="es-ES" baseline="0" dirty="0" err="1" smtClean="0"/>
+              <a:t>also</a:t>
+            </a:r>
+            <a:r>
+              <a:rPr lang="es-ES" baseline="0" dirty="0" smtClean="0"/>
+              <a:t> </a:t>
+            </a:r>
+            <a:r>
+              <a:rPr lang="es-ES" baseline="0" dirty="0" err="1" smtClean="0"/>
+              <a:t>included</a:t>
+            </a:r>
+            <a:r>
+              <a:rPr lang="es-ES" baseline="0" dirty="0" smtClean="0"/>
+              <a:t> </a:t>
+            </a:r>
+            <a:r>
+              <a:rPr lang="es-ES" baseline="0" dirty="0" err="1" smtClean="0"/>
+              <a:t>the</a:t>
+            </a:r>
+            <a:r>
+              <a:rPr lang="es-ES" baseline="0" dirty="0" smtClean="0"/>
+              <a:t> </a:t>
+            </a:r>
+            <a:r>
+              <a:rPr lang="es-ES" baseline="0" dirty="0" err="1" smtClean="0"/>
+              <a:t>first</a:t>
+            </a:r>
+            <a:r>
+              <a:rPr lang="es-ES" baseline="0" dirty="0" smtClean="0"/>
+              <a:t> </a:t>
+            </a:r>
+            <a:r>
+              <a:rPr lang="es-ES" baseline="0" dirty="0" err="1" smtClean="0"/>
+              <a:t>deriverable</a:t>
+            </a:r>
+            <a:r>
+              <a:rPr lang="es-ES" baseline="0" dirty="0" smtClean="0"/>
+              <a:t>. </a:t>
+            </a:r>
+            <a:r>
+              <a:rPr lang="es-ES" baseline="0" dirty="0" err="1" smtClean="0"/>
+              <a:t>The</a:t>
+            </a:r>
+            <a:r>
+              <a:rPr lang="es-ES" baseline="0" dirty="0" smtClean="0"/>
+              <a:t> </a:t>
+            </a:r>
+            <a:r>
+              <a:rPr lang="es-ES" baseline="0" dirty="0" err="1" smtClean="0"/>
+              <a:t>bussines</a:t>
+            </a:r>
+            <a:r>
+              <a:rPr lang="es-ES" baseline="0" dirty="0" smtClean="0"/>
+              <a:t> </a:t>
+            </a:r>
+            <a:r>
+              <a:rPr lang="es-ES" baseline="0" dirty="0" err="1" smtClean="0"/>
+              <a:t>logic</a:t>
+            </a:r>
+            <a:r>
+              <a:rPr lang="es-ES" baseline="0" dirty="0" smtClean="0"/>
+              <a:t> </a:t>
+            </a:r>
+            <a:r>
+              <a:rPr lang="es-ES" baseline="0" dirty="0" err="1" smtClean="0"/>
+              <a:t>that</a:t>
+            </a:r>
+            <a:r>
+              <a:rPr lang="es-ES" baseline="0" dirty="0" smtClean="0"/>
+              <a:t> </a:t>
+            </a:r>
+            <a:r>
+              <a:rPr lang="es-ES" baseline="0" dirty="0" err="1" smtClean="0"/>
+              <a:t>it’s</a:t>
+            </a:r>
+            <a:r>
+              <a:rPr lang="es-ES" baseline="0" dirty="0" smtClean="0"/>
+              <a:t> </a:t>
+            </a:r>
+            <a:r>
+              <a:rPr lang="es-ES" baseline="0" dirty="0" err="1" smtClean="0"/>
+              <a:t>the</a:t>
+            </a:r>
+            <a:r>
+              <a:rPr lang="es-ES" baseline="0" dirty="0" smtClean="0"/>
+              <a:t> </a:t>
+            </a:r>
+            <a:r>
+              <a:rPr lang="es-ES" baseline="0" dirty="0" err="1" smtClean="0"/>
+              <a:t>Model</a:t>
+            </a:r>
+            <a:r>
+              <a:rPr lang="es-ES" baseline="0" dirty="0" smtClean="0"/>
+              <a:t> </a:t>
+            </a:r>
+            <a:r>
+              <a:rPr lang="es-ES" baseline="0" dirty="0" err="1" smtClean="0"/>
+              <a:t>package</a:t>
+            </a:r>
+            <a:r>
+              <a:rPr lang="es-ES" baseline="0" dirty="0" smtClean="0"/>
+              <a:t> and </a:t>
+            </a:r>
+            <a:r>
+              <a:rPr lang="es-ES" baseline="0" dirty="0" err="1" smtClean="0"/>
+              <a:t>the</a:t>
+            </a:r>
+            <a:r>
+              <a:rPr lang="es-ES" baseline="0" dirty="0" smtClean="0"/>
+              <a:t> </a:t>
+            </a:r>
+            <a:r>
+              <a:rPr lang="es-ES" baseline="0" dirty="0" err="1" smtClean="0"/>
+              <a:t>Views</a:t>
+            </a:r>
+            <a:r>
+              <a:rPr lang="es-ES" baseline="0" dirty="0" smtClean="0"/>
+              <a:t> </a:t>
+            </a:r>
+            <a:r>
+              <a:rPr lang="es-ES" baseline="0" dirty="0" err="1" smtClean="0"/>
+              <a:t>that</a:t>
+            </a:r>
+            <a:r>
+              <a:rPr lang="es-ES" baseline="0" dirty="0" smtClean="0"/>
+              <a:t> are </a:t>
+            </a:r>
+            <a:r>
+              <a:rPr lang="es-ES" baseline="0" dirty="0" err="1" smtClean="0"/>
+              <a:t>on</a:t>
+            </a:r>
+            <a:r>
+              <a:rPr lang="es-ES" baseline="0" dirty="0" smtClean="0"/>
+              <a:t> </a:t>
+            </a:r>
+            <a:r>
+              <a:rPr lang="es-ES" baseline="0" dirty="0" err="1" smtClean="0"/>
+              <a:t>the</a:t>
+            </a:r>
+            <a:r>
+              <a:rPr lang="es-ES" baseline="0" dirty="0" smtClean="0"/>
+              <a:t> </a:t>
+            </a:r>
+            <a:r>
+              <a:rPr lang="es-ES" baseline="0" dirty="0" err="1" smtClean="0"/>
+              <a:t>gui</a:t>
+            </a:r>
+            <a:r>
+              <a:rPr lang="es-ES" baseline="0" dirty="0" smtClean="0"/>
+              <a:t> </a:t>
+            </a:r>
+            <a:r>
+              <a:rPr lang="es-ES" baseline="0" dirty="0" err="1" smtClean="0"/>
+              <a:t>package</a:t>
+            </a:r>
+            <a:r>
+              <a:rPr lang="es-ES" baseline="0" dirty="0" smtClean="0"/>
+              <a:t>. </a:t>
+            </a:r>
+            <a:endParaRPr lang="es-ES" dirty="0"/>
+          </a:p>
+        </p:txBody>
+      </p:sp>
+      <p:sp>
+        <p:nvSpPr>
+          <p:cNvPr id="4" name="Marcador de número de diapositiva 3"/>
+          <p:cNvSpPr>
+            <a:spLocks noGrp="1"/>
+          </p:cNvSpPr>
+          <p:nvPr>
+            <p:ph type="sldNum" sz="quarter" idx="10"/>
+          </p:nvPr>
+        </p:nvSpPr>
+        <p:spPr/>
+        <p:txBody>
+          <a:bodyPr/>
+          <a:lstStyle/>
+          <a:p>
+            <a:fld id="{3EBA5BD7-F043-4D1B-AA17-CD412FC534DE}" type="slidenum">
+              <a:rPr lang="es-ES" smtClean="0"/>
+              <a:t>13</a:t>
+            </a:fld>
+            <a:endParaRPr lang="es-ES"/>
+          </a:p>
+        </p:txBody>
+      </p:sp>
+    </p:spTree>
+    <p:extLst>
+      <p:ext uri="{BB962C8B-B14F-4D97-AF65-F5344CB8AC3E}">
+        <p14:creationId xmlns:p14="http://schemas.microsoft.com/office/powerpoint/2010/main" val="2337850728"/>
+      </p:ext>
+    </p:extLst>
+  </p:cSld>
+  <p:clrMapOvr>
+    <a:masterClrMapping/>
+  </p:clrMapOvr>
+</p:notes>
+</file>
+
+<file path=ppt/notesSlides/notesSlide7.xml><?xml version="1.0" encoding="utf-8"?>
+<p:notes xmlns:a="http://schemas.openxmlformats.org/drawingml/2006/main" xmlns:r="http://schemas.openxmlformats.org/officeDocument/2006/relationships" xmlns:p="http://schemas.openxmlformats.org/presentationml/2006/main">
+  <p:cSld>
+    <p:spTree>
+      <p:nvGrpSpPr>
+        <p:cNvPr id="1" name=""/>
+        <p:cNvGrpSpPr/>
+        <p:nvPr/>
+      </p:nvGrpSpPr>
+      <p:grpSpPr>
+        <a:xfrm>
+          <a:off x="0" y="0"/>
+          <a:ext cx="0" cy="0"/>
+          <a:chOff x="0" y="0"/>
+          <a:chExt cx="0" cy="0"/>
+        </a:xfrm>
+      </p:grpSpPr>
+      <p:sp>
+        <p:nvSpPr>
+          <p:cNvPr id="2" name="Marcador de imagen de diapositiva 1"/>
+          <p:cNvSpPr>
+            <a:spLocks noGrp="1" noRot="1" noChangeAspect="1"/>
+          </p:cNvSpPr>
+          <p:nvPr>
+            <p:ph type="sldImg"/>
+          </p:nvPr>
+        </p:nvSpPr>
+        <p:spPr/>
+      </p:sp>
+      <p:sp>
+        <p:nvSpPr>
+          <p:cNvPr id="3" name="Marcador de notas 2"/>
+          <p:cNvSpPr>
+            <a:spLocks noGrp="1"/>
+          </p:cNvSpPr>
+          <p:nvPr>
+            <p:ph type="body" idx="1"/>
+          </p:nvPr>
+        </p:nvSpPr>
+        <p:spPr/>
+        <p:txBody>
+          <a:bodyPr/>
+          <a:lstStyle/>
+          <a:p>
+            <a:endParaRPr lang="es-ES" dirty="0"/>
+          </a:p>
+        </p:txBody>
+      </p:sp>
+      <p:sp>
+        <p:nvSpPr>
+          <p:cNvPr id="4" name="Marcador de número de diapositiva 3"/>
+          <p:cNvSpPr>
+            <a:spLocks noGrp="1"/>
+          </p:cNvSpPr>
+          <p:nvPr>
+            <p:ph type="sldNum" sz="quarter" idx="10"/>
+          </p:nvPr>
+        </p:nvSpPr>
+        <p:spPr/>
+        <p:txBody>
+          <a:bodyPr/>
+          <a:lstStyle/>
+          <a:p>
+            <a:fld id="{3EBA5BD7-F043-4D1B-AA17-CD412FC534DE}" type="slidenum">
+              <a:rPr lang="es-ES" smtClean="0"/>
+              <a:t>15</a:t>
+            </a:fld>
+            <a:endParaRPr lang="es-ES"/>
+          </a:p>
+        </p:txBody>
+      </p:sp>
+    </p:spTree>
+    <p:extLst>
+      <p:ext uri="{BB962C8B-B14F-4D97-AF65-F5344CB8AC3E}">
+        <p14:creationId xmlns:p14="http://schemas.microsoft.com/office/powerpoint/2010/main" val="1585916322"/>
       </p:ext>
     </p:extLst>
   </p:cSld>
@@ -8055,12 +8764,12 @@
       </p:grpSpPr>
       <p:sp>
         <p:nvSpPr>
-          <p:cNvPr id="2" name="Title 1"/>
-          <p:cNvSpPr>
-            <a:spLocks noGrp="1"/>
-          </p:cNvSpPr>
-          <p:nvPr>
-            <p:ph type="ctrTitle"/>
+          <p:cNvPr id="7" name="Title 6"/>
+          <p:cNvSpPr>
+            <a:spLocks noGrp="1"/>
+          </p:cNvSpPr>
+          <p:nvPr>
+            <p:ph type="title"/>
           </p:nvPr>
         </p:nvSpPr>
         <p:spPr/>
@@ -8068,60 +8777,93 @@
           <a:bodyPr/>
           <a:lstStyle/>
           <a:p>
-            <a:pPr algn="l" defTabSz="1216152">
-              <a:lnSpc>
-                <a:spcPct val="90000"/>
-              </a:lnSpc>
+            <a:r>
+              <a:rPr lang="en-US" sz="4800" dirty="0" smtClean="0"/>
+              <a:t>Description</a:t>
+            </a:r>
+            <a:endParaRPr lang="en-US" dirty="0"/>
+          </a:p>
+        </p:txBody>
+      </p:sp>
+      <p:sp>
+        <p:nvSpPr>
+          <p:cNvPr id="10" name="Content Placeholder 9"/>
+          <p:cNvSpPr>
+            <a:spLocks noGrp="1"/>
+          </p:cNvSpPr>
+          <p:nvPr>
+            <p:ph sz="half" idx="2"/>
+          </p:nvPr>
+        </p:nvSpPr>
+        <p:spPr>
+          <a:xfrm>
+            <a:off x="909836" y="1853248"/>
+            <a:ext cx="5040559" cy="4403090"/>
+          </a:xfrm>
+        </p:spPr>
+        <p:txBody>
+          <a:bodyPr>
+            <a:normAutofit/>
+          </a:bodyPr>
+          <a:lstStyle/>
+          <a:p>
+            <a:pPr>
               <a:spcBef>
-                <a:spcPts val="0"/>
+                <a:spcPts val="2400"/>
               </a:spcBef>
-              <a:buNone/>
             </a:pPr>
             <a:r>
-              <a:rPr lang="en-GB" sz="5400" dirty="0" smtClean="0">
-                <a:solidFill>
-                  <a:schemeClr val="tx1"/>
-                </a:solidFill>
-                <a:latin typeface="Calibri"/>
-              </a:rPr>
-              <a:t>Third Deliverable :</a:t>
-            </a:r>
-            <a:br>
-              <a:rPr lang="en-GB" sz="5400" dirty="0" smtClean="0">
-                <a:solidFill>
-                  <a:schemeClr val="tx1"/>
-                </a:solidFill>
-                <a:latin typeface="Calibri"/>
-              </a:rPr>
-            </a:br>
-            <a:r>
-              <a:rPr lang="en-GB" sz="8000" dirty="0" smtClean="0">
-                <a:solidFill>
-                  <a:schemeClr val="tx1"/>
-                </a:solidFill>
-                <a:latin typeface="Calibri"/>
-              </a:rPr>
-              <a:t>WEB APPLICATION</a:t>
-            </a:r>
-            <a:endParaRPr lang="en-GB" sz="8000" b="0" i="0" dirty="0">
-              <a:solidFill>
-                <a:schemeClr val="tx1"/>
-              </a:solidFill>
-              <a:latin typeface="Calibri"/>
-            </a:endParaRPr>
+              <a:rPr lang="en-US" sz="3600" dirty="0" smtClean="0"/>
+              <a:t>Desktop Application </a:t>
+            </a:r>
+            <a:endParaRPr lang="en-US" sz="3600" dirty="0" smtClean="0"/>
+          </a:p>
+          <a:p>
+            <a:pPr>
+              <a:spcBef>
+                <a:spcPts val="2400"/>
+              </a:spcBef>
+            </a:pPr>
+            <a:r>
+              <a:rPr lang="en-US" sz="3600" dirty="0" smtClean="0"/>
+              <a:t>Register users </a:t>
+            </a:r>
+          </a:p>
+          <a:p>
+            <a:pPr lvl="1">
+              <a:spcBef>
+                <a:spcPts val="2400"/>
+              </a:spcBef>
+            </a:pPr>
+            <a:r>
+              <a:rPr lang="en-US" sz="3401" dirty="0" smtClean="0"/>
+              <a:t>User </a:t>
+            </a:r>
+          </a:p>
+          <a:p>
+            <a:pPr lvl="1">
+              <a:spcBef>
+                <a:spcPts val="2400"/>
+              </a:spcBef>
+            </a:pPr>
+            <a:r>
+              <a:rPr lang="en-US" sz="3401" dirty="0" smtClean="0"/>
+              <a:t>Admin</a:t>
+            </a:r>
+            <a:endParaRPr lang="en-US" sz="3401" dirty="0"/>
           </a:p>
         </p:txBody>
       </p:sp>
       <p:pic>
         <p:nvPicPr>
-          <p:cNvPr id="6" name="Imagen 5"/>
+          <p:cNvPr id="5" name="Imagen 4"/>
           <p:cNvPicPr>
             <a:picLocks noChangeAspect="1"/>
           </p:cNvPicPr>
           <p:nvPr/>
         </p:nvPicPr>
         <p:blipFill>
-          <a:blip r:embed="rId2">
+          <a:blip r:embed="rId3" cstate="print">
             <a:extLst>
               <a:ext uri="{28A0092B-C50C-407E-A947-70E740481C1C}">
                 <a14:useLocalDpi xmlns:a14="http://schemas.microsoft.com/office/drawing/2010/main" val="0"/>
@@ -8134,8 +8876,8 @@
         </p:blipFill>
         <p:spPr>
           <a:xfrm>
-            <a:off x="9514474" y="4777380"/>
-            <a:ext cx="2913621" cy="1671047"/>
+            <a:off x="8848015" y="2607549"/>
+            <a:ext cx="2400404" cy="2400404"/>
           </a:xfrm>
           <a:prstGeom prst="rect">
             <a:avLst/>
@@ -8144,59 +8886,233 @@
       </p:pic>
       <p:sp>
         <p:nvSpPr>
-          <p:cNvPr id="7" name="Subtitle 4"/>
-          <p:cNvSpPr>
-            <a:spLocks noGrp="1"/>
-          </p:cNvSpPr>
-          <p:nvPr>
-            <p:ph type="subTitle" idx="1"/>
-          </p:nvPr>
-        </p:nvSpPr>
+          <p:cNvPr id="8" name="AutoShape 2" descr="https://cdn4.iconfinder.com/data/icons/flat-icon-set/2133/flat_icons-graficheria.it-01.png"/>
+          <p:cNvSpPr>
+            <a:spLocks noChangeAspect="1" noChangeArrowheads="1"/>
+          </p:cNvSpPr>
+          <p:nvPr/>
+        </p:nvSpPr>
+        <p:spPr bwMode="auto">
+          <a:xfrm>
+            <a:off x="5645595" y="4070415"/>
+            <a:ext cx="2967824" cy="2967834"/>
+          </a:xfrm>
+          <a:prstGeom prst="rect">
+            <a:avLst/>
+          </a:prstGeom>
+          <a:noFill/>
+          <a:extLst>
+            <a:ext uri="{909E8E84-426E-40DD-AFC4-6F175D3DCCD1}">
+              <a14:hiddenFill xmlns:a14="http://schemas.microsoft.com/office/drawing/2010/main">
+                <a:solidFill>
+                  <a:srgbClr val="FFFFFF"/>
+                </a:solidFill>
+              </a14:hiddenFill>
+            </a:ext>
+          </a:extLst>
+        </p:spPr>
+        <p:txBody>
+          <a:bodyPr vert="horz" wrap="square" lIns="91440" tIns="45720" rIns="91440" bIns="45720" numCol="1" anchor="t" anchorCtr="0" compatLnSpc="1">
+            <a:prstTxWarp prst="textNoShape">
+              <a:avLst/>
+            </a:prstTxWarp>
+          </a:bodyPr>
+          <a:lstStyle/>
+          <a:p>
+            <a:endParaRPr lang="es-ES"/>
+          </a:p>
+        </p:txBody>
+      </p:sp>
+      <p:pic>
+        <p:nvPicPr>
+          <p:cNvPr id="4100" name="Picture 4" descr="https://cdn4.iconfinder.com/data/icons/flat-icon-set/2133/flat_icons-graficheria.it-01.png"/>
+          <p:cNvPicPr>
+            <a:picLocks noChangeAspect="1" noChangeArrowheads="1"/>
+          </p:cNvPicPr>
+          <p:nvPr/>
+        </p:nvPicPr>
+        <p:blipFill>
+          <a:blip r:embed="rId4" cstate="print">
+            <a:extLst>
+              <a:ext uri="{28A0092B-C50C-407E-A947-70E740481C1C}">
+                <a14:useLocalDpi xmlns:a14="http://schemas.microsoft.com/office/drawing/2010/main" val="0"/>
+              </a:ext>
+            </a:extLst>
+          </a:blip>
+          <a:srcRect/>
+          <a:stretch>
+            <a:fillRect/>
+          </a:stretch>
+        </p:blipFill>
+        <p:spPr bwMode="auto">
+          <a:xfrm>
+            <a:off x="155575" y="-9745663"/>
+            <a:ext cx="1958400" cy="1958400"/>
+          </a:xfrm>
+          <a:prstGeom prst="rect">
+            <a:avLst/>
+          </a:prstGeom>
+          <a:noFill/>
+          <a:extLst>
+            <a:ext uri="{909E8E84-426E-40DD-AFC4-6F175D3DCCD1}">
+              <a14:hiddenFill xmlns:a14="http://schemas.microsoft.com/office/drawing/2010/main">
+                <a:solidFill>
+                  <a:srgbClr val="FFFFFF"/>
+                </a:solidFill>
+              </a14:hiddenFill>
+            </a:ext>
+          </a:extLst>
+        </p:spPr>
+      </p:pic>
+      <p:pic>
+        <p:nvPicPr>
+          <p:cNvPr id="9" name="Imagen 8"/>
+          <p:cNvPicPr>
+            <a:picLocks noChangeAspect="1"/>
+          </p:cNvPicPr>
+          <p:nvPr/>
+        </p:nvPicPr>
+        <p:blipFill>
+          <a:blip r:embed="rId5"/>
+          <a:stretch>
+            <a:fillRect/>
+          </a:stretch>
+        </p:blipFill>
         <p:spPr>
           <a:xfrm>
-            <a:off x="88931" y="6186513"/>
-            <a:ext cx="2131446" cy="523828"/>
+            <a:off x="-4064001" y="-6729413"/>
+            <a:ext cx="1958400" cy="1958400"/>
           </a:xfrm>
+          <a:prstGeom prst="rect">
+            <a:avLst/>
+          </a:prstGeom>
         </p:spPr>
-        <p:txBody>
-          <a:bodyPr/>
+      </p:pic>
+      <p:pic>
+        <p:nvPicPr>
+          <p:cNvPr id="4102" name="Picture 6" descr="http://www.technomouse.lt/wp-content/uploads/2014/11/computer-icon2.png"/>
+          <p:cNvPicPr>
+            <a:picLocks noChangeAspect="1" noChangeArrowheads="1"/>
+          </p:cNvPicPr>
+          <p:nvPr/>
+        </p:nvPicPr>
+        <p:blipFill>
+          <a:blip r:embed="rId6">
+            <a:extLst>
+              <a:ext uri="{28A0092B-C50C-407E-A947-70E740481C1C}">
+                <a14:useLocalDpi xmlns:a14="http://schemas.microsoft.com/office/drawing/2010/main" val="0"/>
+              </a:ext>
+            </a:extLst>
+          </a:blip>
+          <a:srcRect/>
+          <a:stretch>
+            <a:fillRect/>
+          </a:stretch>
+        </p:blipFill>
+        <p:spPr bwMode="auto">
+          <a:xfrm>
+            <a:off x="5510493" y="908720"/>
+            <a:ext cx="2521966" cy="2521968"/>
+          </a:xfrm>
+          <a:prstGeom prst="rect">
+            <a:avLst/>
+          </a:prstGeom>
+          <a:noFill/>
+          <a:extLst>
+            <a:ext uri="{909E8E84-426E-40DD-AFC4-6F175D3DCCD1}">
+              <a14:hiddenFill xmlns:a14="http://schemas.microsoft.com/office/drawing/2010/main">
+                <a:solidFill>
+                  <a:srgbClr val="FFFFFF"/>
+                </a:solidFill>
+              </a14:hiddenFill>
+            </a:ext>
+          </a:extLst>
+        </p:spPr>
+      </p:pic>
+      <p:sp>
+        <p:nvSpPr>
+          <p:cNvPr id="11" name="AutoShape 8" descr="http://www.iconarchive.com/download/i85541/graphicloads/100-flat/analytics.ico"/>
+          <p:cNvSpPr>
+            <a:spLocks noChangeAspect="1" noChangeArrowheads="1"/>
+          </p:cNvSpPr>
+          <p:nvPr/>
+        </p:nvSpPr>
+        <p:spPr bwMode="auto">
+          <a:xfrm>
+            <a:off x="307975" y="7937"/>
+            <a:ext cx="304800" cy="304801"/>
+          </a:xfrm>
+          <a:prstGeom prst="rect">
+            <a:avLst/>
+          </a:prstGeom>
+          <a:noFill/>
+          <a:extLst>
+            <a:ext uri="{909E8E84-426E-40DD-AFC4-6F175D3DCCD1}">
+              <a14:hiddenFill xmlns:a14="http://schemas.microsoft.com/office/drawing/2010/main">
+                <a:solidFill>
+                  <a:srgbClr val="FFFFFF"/>
+                </a:solidFill>
+              </a14:hiddenFill>
+            </a:ext>
+          </a:extLst>
+        </p:spPr>
+        <p:txBody>
+          <a:bodyPr vert="horz" wrap="square" lIns="91440" tIns="45720" rIns="91440" bIns="45720" numCol="1" anchor="t" anchorCtr="0" compatLnSpc="1">
+            <a:prstTxWarp prst="textNoShape">
+              <a:avLst/>
+            </a:prstTxWarp>
+          </a:bodyPr>
           <a:lstStyle/>
           <a:p>
-            <a:pPr>
-              <a:spcBef>
-                <a:spcPts val="0"/>
-              </a:spcBef>
-            </a:pPr>
-            <a:r>
-              <a:rPr lang="es-ES_tradnl" sz="2800" dirty="0">
+            <a:endParaRPr lang="es-ES"/>
+          </a:p>
+        </p:txBody>
+      </p:sp>
+      <p:pic>
+        <p:nvPicPr>
+          <p:cNvPr id="4107" name="Picture 11" descr="https://cdn4.iconfinder.com/data/icons/presentation/63/Presentation_chart_graph_analysis_statistics_analytics_business_admin_seo_web_mobile_internet_icon_user_finance_diagram_powerpoint-32-512.png"/>
+          <p:cNvPicPr>
+            <a:picLocks noChangeAspect="1" noChangeArrowheads="1"/>
+          </p:cNvPicPr>
+          <p:nvPr/>
+        </p:nvPicPr>
+        <p:blipFill>
+          <a:blip r:embed="rId7">
+            <a:extLst>
+              <a:ext uri="{28A0092B-C50C-407E-A947-70E740481C1C}">
+                <a14:useLocalDpi xmlns:a14="http://schemas.microsoft.com/office/drawing/2010/main" val="0"/>
+              </a:ext>
+            </a:extLst>
+          </a:blip>
+          <a:srcRect/>
+          <a:stretch>
+            <a:fillRect/>
+          </a:stretch>
+        </p:blipFill>
+        <p:spPr bwMode="auto">
+          <a:xfrm>
+            <a:off x="5557991" y="3832616"/>
+            <a:ext cx="2415920" cy="2297956"/>
+          </a:xfrm>
+          <a:prstGeom prst="rect">
+            <a:avLst/>
+          </a:prstGeom>
+          <a:noFill/>
+          <a:extLst>
+            <a:ext uri="{909E8E84-426E-40DD-AFC4-6F175D3DCCD1}">
+              <a14:hiddenFill xmlns:a14="http://schemas.microsoft.com/office/drawing/2010/main">
                 <a:solidFill>
-                  <a:schemeClr val="tx1"/>
+                  <a:srgbClr val="FFFFFF"/>
                 </a:solidFill>
-                <a:latin typeface="Calibri"/>
-              </a:rPr>
-              <a:t>Trivial </a:t>
-            </a:r>
-            <a:r>
-              <a:rPr lang="es-ES_tradnl" sz="2800" dirty="0" smtClean="0">
-                <a:solidFill>
-                  <a:schemeClr val="tx1"/>
-                </a:solidFill>
-                <a:latin typeface="Calibri"/>
-              </a:rPr>
-              <a:t>i1b</a:t>
-            </a:r>
-            <a:endParaRPr lang="es-ES_tradnl" sz="2800" b="0" i="0" spc="200" baseline="0" dirty="0">
-              <a:solidFill>
-                <a:srgbClr val="009999"/>
-              </a:solidFill>
-            </a:endParaRPr>
-          </a:p>
-        </p:txBody>
-      </p:sp>
+              </a14:hiddenFill>
+            </a:ext>
+          </a:extLst>
+        </p:spPr>
+      </p:pic>
     </p:spTree>
     <p:extLst>
       <p:ext uri="{BB962C8B-B14F-4D97-AF65-F5344CB8AC3E}">
-        <p14:creationId xmlns:p14="http://schemas.microsoft.com/office/powerpoint/2010/main" val="3353501265"/>
+        <p14:creationId xmlns:p14="http://schemas.microsoft.com/office/powerpoint/2010/main" val="3895468124"/>
       </p:ext>
     </p:extLst>
   </p:cSld>
@@ -8244,6 +9160,1098 @@
       </p:grpSpPr>
       <p:sp>
         <p:nvSpPr>
+          <p:cNvPr id="2" name="Título 1"/>
+          <p:cNvSpPr>
+            <a:spLocks noGrp="1"/>
+          </p:cNvSpPr>
+          <p:nvPr>
+            <p:ph type="title"/>
+          </p:nvPr>
+        </p:nvSpPr>
+        <p:spPr/>
+        <p:txBody>
+          <a:bodyPr/>
+          <a:lstStyle/>
+          <a:p>
+            <a:r>
+              <a:rPr lang="en-GB" sz="4800" dirty="0" smtClean="0"/>
+              <a:t>Architecture</a:t>
+            </a:r>
+            <a:endParaRPr lang="en-GB" sz="4400" dirty="0"/>
+          </a:p>
+        </p:txBody>
+      </p:sp>
+      <p:sp>
+        <p:nvSpPr>
+          <p:cNvPr id="6" name="Marcador de contenido 5"/>
+          <p:cNvSpPr>
+            <a:spLocks noGrp="1"/>
+          </p:cNvSpPr>
+          <p:nvPr>
+            <p:ph sz="quarter" idx="4"/>
+          </p:nvPr>
+        </p:nvSpPr>
+        <p:spPr>
+          <a:xfrm>
+            <a:off x="645943" y="1824876"/>
+            <a:ext cx="4080317" cy="4431462"/>
+          </a:xfrm>
+        </p:spPr>
+        <p:txBody>
+          <a:bodyPr>
+            <a:normAutofit/>
+          </a:bodyPr>
+          <a:lstStyle/>
+          <a:p>
+            <a:r>
+              <a:rPr lang="en-GB" sz="2400" dirty="0" smtClean="0"/>
+              <a:t>Model-View –Controller </a:t>
+            </a:r>
+          </a:p>
+          <a:p>
+            <a:pPr marL="0" indent="0">
+              <a:buNone/>
+            </a:pPr>
+            <a:endParaRPr lang="en-GB" sz="2400" dirty="0" smtClean="0"/>
+          </a:p>
+          <a:p>
+            <a:pPr marL="457063" lvl="1" indent="0">
+              <a:buNone/>
+            </a:pPr>
+            <a:r>
+              <a:rPr lang="en-GB" sz="2400" dirty="0" smtClean="0"/>
+              <a:t>	</a:t>
+            </a:r>
+            <a:endParaRPr lang="en-GB" sz="2400" dirty="0"/>
+          </a:p>
+        </p:txBody>
+      </p:sp>
+      <p:pic>
+        <p:nvPicPr>
+          <p:cNvPr id="4" name="Marcador de contenido 3"/>
+          <p:cNvPicPr>
+            <a:picLocks noGrp="1" noChangeAspect="1"/>
+          </p:cNvPicPr>
+          <p:nvPr>
+            <p:ph sz="half" idx="2"/>
+          </p:nvPr>
+        </p:nvPicPr>
+        <p:blipFill>
+          <a:blip r:embed="rId3">
+            <a:extLst>
+              <a:ext uri="{28A0092B-C50C-407E-A947-70E740481C1C}">
+                <a14:useLocalDpi xmlns:a14="http://schemas.microsoft.com/office/drawing/2010/main" val="0"/>
+              </a:ext>
+            </a:extLst>
+          </a:blip>
+          <a:stretch>
+            <a:fillRect/>
+          </a:stretch>
+        </p:blipFill>
+        <p:spPr>
+          <a:xfrm>
+            <a:off x="4222204" y="1851168"/>
+            <a:ext cx="6025781" cy="4464496"/>
+          </a:xfrm>
+        </p:spPr>
+      </p:pic>
+    </p:spTree>
+    <p:extLst>
+      <p:ext uri="{BB962C8B-B14F-4D97-AF65-F5344CB8AC3E}">
+        <p14:creationId xmlns:p14="http://schemas.microsoft.com/office/powerpoint/2010/main" val="2531742123"/>
+      </p:ext>
+    </p:extLst>
+  </p:cSld>
+  <p:clrMapOvr>
+    <a:masterClrMapping/>
+  </p:clrMapOvr>
+  <mc:AlternateContent xmlns:mc="http://schemas.openxmlformats.org/markup-compatibility/2006" xmlns:p14="http://schemas.microsoft.com/office/powerpoint/2010/main">
+    <mc:Choice Requires="p14">
+      <p:transition spd="med" p14:dur="700">
+        <p:fade/>
+      </p:transition>
+    </mc:Choice>
+    <mc:Fallback xmlns="">
+      <p:transition spd="med">
+        <p:fade/>
+      </p:transition>
+    </mc:Fallback>
+  </mc:AlternateContent>
+  <p:timing>
+    <p:tnLst>
+      <p:par>
+        <p:cTn id="1" dur="indefinite" restart="never" nodeType="tmRoot"/>
+      </p:par>
+    </p:tnLst>
+  </p:timing>
+</p:sld>
+</file>
+
+<file path=ppt/slides/slide13.xml><?xml version="1.0" encoding="utf-8"?>
+<p:sld xmlns:a="http://schemas.openxmlformats.org/drawingml/2006/main" xmlns:r="http://schemas.openxmlformats.org/officeDocument/2006/relationships" xmlns:p="http://schemas.openxmlformats.org/presentationml/2006/main">
+  <p:cSld>
+    <p:spTree>
+      <p:nvGrpSpPr>
+        <p:cNvPr id="1" name=""/>
+        <p:cNvGrpSpPr/>
+        <p:nvPr/>
+      </p:nvGrpSpPr>
+      <p:grpSpPr>
+        <a:xfrm>
+          <a:off x="0" y="0"/>
+          <a:ext cx="0" cy="0"/>
+          <a:chOff x="0" y="0"/>
+          <a:chExt cx="0" cy="0"/>
+        </a:xfrm>
+      </p:grpSpPr>
+      <p:sp>
+        <p:nvSpPr>
+          <p:cNvPr id="2" name="Título 1"/>
+          <p:cNvSpPr>
+            <a:spLocks noGrp="1"/>
+          </p:cNvSpPr>
+          <p:nvPr>
+            <p:ph type="title"/>
+          </p:nvPr>
+        </p:nvSpPr>
+        <p:spPr/>
+        <p:txBody>
+          <a:bodyPr/>
+          <a:lstStyle/>
+          <a:p>
+            <a:r>
+              <a:rPr lang="en-GB" sz="4800" dirty="0"/>
+              <a:t>Architecture</a:t>
+            </a:r>
+            <a:endParaRPr lang="es-ES" sz="4400" dirty="0"/>
+          </a:p>
+        </p:txBody>
+      </p:sp>
+      <p:pic>
+        <p:nvPicPr>
+          <p:cNvPr id="6" name="Marcador de contenido 5"/>
+          <p:cNvPicPr>
+            <a:picLocks noGrp="1" noChangeAspect="1"/>
+          </p:cNvPicPr>
+          <p:nvPr>
+            <p:ph idx="1"/>
+          </p:nvPr>
+        </p:nvPicPr>
+        <p:blipFill>
+          <a:blip r:embed="rId3">
+            <a:extLst>
+              <a:ext uri="{28A0092B-C50C-407E-A947-70E740481C1C}">
+                <a14:useLocalDpi xmlns:a14="http://schemas.microsoft.com/office/drawing/2010/main" val="0"/>
+              </a:ext>
+            </a:extLst>
+          </a:blip>
+          <a:stretch>
+            <a:fillRect/>
+          </a:stretch>
+        </p:blipFill>
+        <p:spPr>
+          <a:xfrm>
+            <a:off x="261764" y="1856214"/>
+            <a:ext cx="11429996" cy="4104456"/>
+          </a:xfrm>
+        </p:spPr>
+      </p:pic>
+    </p:spTree>
+    <p:extLst>
+      <p:ext uri="{BB962C8B-B14F-4D97-AF65-F5344CB8AC3E}">
+        <p14:creationId xmlns:p14="http://schemas.microsoft.com/office/powerpoint/2010/main" val="3840546312"/>
+      </p:ext>
+    </p:extLst>
+  </p:cSld>
+  <p:clrMapOvr>
+    <a:masterClrMapping/>
+  </p:clrMapOvr>
+  <mc:AlternateContent xmlns:mc="http://schemas.openxmlformats.org/markup-compatibility/2006">
+    <mc:Choice xmlns:p14="http://schemas.microsoft.com/office/powerpoint/2010/main" Requires="p14">
+      <p:transition spd="med" p14:dur="700">
+        <p:fade/>
+      </p:transition>
+    </mc:Choice>
+    <mc:Fallback>
+      <p:transition spd="med">
+        <p:fade/>
+      </p:transition>
+    </mc:Fallback>
+  </mc:AlternateContent>
+  <p:timing>
+    <p:tnLst>
+      <p:par>
+        <p:cTn id="1" dur="indefinite" restart="never" nodeType="tmRoot"/>
+      </p:par>
+    </p:tnLst>
+  </p:timing>
+</p:sld>
+</file>
+
+<file path=ppt/slides/slide14.xml><?xml version="1.0" encoding="utf-8"?>
+<p:sld xmlns:a="http://schemas.openxmlformats.org/drawingml/2006/main" xmlns:r="http://schemas.openxmlformats.org/officeDocument/2006/relationships" xmlns:p="http://schemas.openxmlformats.org/presentationml/2006/main">
+  <p:cSld>
+    <p:spTree>
+      <p:nvGrpSpPr>
+        <p:cNvPr id="1" name=""/>
+        <p:cNvGrpSpPr/>
+        <p:nvPr/>
+      </p:nvGrpSpPr>
+      <p:grpSpPr>
+        <a:xfrm>
+          <a:off x="0" y="0"/>
+          <a:ext cx="0" cy="0"/>
+          <a:chOff x="0" y="0"/>
+          <a:chExt cx="0" cy="0"/>
+        </a:xfrm>
+      </p:grpSpPr>
+      <p:sp>
+        <p:nvSpPr>
+          <p:cNvPr id="2" name="Título 1"/>
+          <p:cNvSpPr>
+            <a:spLocks noGrp="1"/>
+          </p:cNvSpPr>
+          <p:nvPr>
+            <p:ph type="title"/>
+          </p:nvPr>
+        </p:nvSpPr>
+        <p:spPr>
+          <a:xfrm>
+            <a:off x="981843" y="452718"/>
+            <a:ext cx="9066373" cy="1400530"/>
+          </a:xfrm>
+        </p:spPr>
+        <p:txBody>
+          <a:bodyPr/>
+          <a:lstStyle/>
+          <a:p>
+            <a:r>
+              <a:rPr lang="en-GB" dirty="0" smtClean="0"/>
+              <a:t>Quality</a:t>
+            </a:r>
+            <a:r>
+              <a:rPr lang="es-ES" dirty="0" smtClean="0"/>
+              <a:t> atributes </a:t>
+            </a:r>
+            <a:endParaRPr lang="es-ES" dirty="0"/>
+          </a:p>
+        </p:txBody>
+      </p:sp>
+      <p:sp>
+        <p:nvSpPr>
+          <p:cNvPr id="3" name="Marcador de texto 2"/>
+          <p:cNvSpPr>
+            <a:spLocks noGrp="1"/>
+          </p:cNvSpPr>
+          <p:nvPr>
+            <p:ph type="body" idx="1"/>
+          </p:nvPr>
+        </p:nvSpPr>
+        <p:spPr/>
+        <p:txBody>
+          <a:bodyPr/>
+          <a:lstStyle/>
+          <a:p>
+            <a:endParaRPr lang="es-ES"/>
+          </a:p>
+        </p:txBody>
+      </p:sp>
+      <p:sp>
+        <p:nvSpPr>
+          <p:cNvPr id="4" name="Marcador de contenido 3"/>
+          <p:cNvSpPr>
+            <a:spLocks noGrp="1"/>
+          </p:cNvSpPr>
+          <p:nvPr>
+            <p:ph sz="half" idx="2"/>
+          </p:nvPr>
+        </p:nvSpPr>
+        <p:spPr/>
+        <p:txBody>
+          <a:bodyPr/>
+          <a:lstStyle/>
+          <a:p>
+            <a:endParaRPr lang="es-ES" dirty="0"/>
+          </a:p>
+        </p:txBody>
+      </p:sp>
+      <p:sp>
+        <p:nvSpPr>
+          <p:cNvPr id="5" name="Marcador de texto 4"/>
+          <p:cNvSpPr>
+            <a:spLocks noGrp="1"/>
+          </p:cNvSpPr>
+          <p:nvPr>
+            <p:ph type="body" sz="quarter" idx="3"/>
+          </p:nvPr>
+        </p:nvSpPr>
+        <p:spPr/>
+        <p:txBody>
+          <a:bodyPr/>
+          <a:lstStyle/>
+          <a:p>
+            <a:endParaRPr lang="es-ES"/>
+          </a:p>
+        </p:txBody>
+      </p:sp>
+      <p:sp>
+        <p:nvSpPr>
+          <p:cNvPr id="6" name="Marcador de contenido 5"/>
+          <p:cNvSpPr>
+            <a:spLocks noGrp="1"/>
+          </p:cNvSpPr>
+          <p:nvPr>
+            <p:ph sz="quarter" idx="4"/>
+          </p:nvPr>
+        </p:nvSpPr>
+        <p:spPr/>
+        <p:txBody>
+          <a:bodyPr/>
+          <a:lstStyle/>
+          <a:p>
+            <a:endParaRPr lang="es-ES"/>
+          </a:p>
+        </p:txBody>
+      </p:sp>
+    </p:spTree>
+    <p:extLst>
+      <p:ext uri="{BB962C8B-B14F-4D97-AF65-F5344CB8AC3E}">
+        <p14:creationId xmlns:p14="http://schemas.microsoft.com/office/powerpoint/2010/main" val="1724074766"/>
+      </p:ext>
+    </p:extLst>
+  </p:cSld>
+  <p:clrMapOvr>
+    <a:masterClrMapping/>
+  </p:clrMapOvr>
+  <mc:AlternateContent xmlns:mc="http://schemas.openxmlformats.org/markup-compatibility/2006" xmlns:p14="http://schemas.microsoft.com/office/powerpoint/2010/main">
+    <mc:Choice Requires="p14">
+      <p:transition spd="med" p14:dur="700">
+        <p:fade/>
+      </p:transition>
+    </mc:Choice>
+    <mc:Fallback xmlns="">
+      <p:transition spd="med">
+        <p:fade/>
+      </p:transition>
+    </mc:Fallback>
+  </mc:AlternateContent>
+  <p:timing>
+    <p:tnLst>
+      <p:par>
+        <p:cTn id="1" dur="indefinite" restart="never" nodeType="tmRoot"/>
+      </p:par>
+    </p:tnLst>
+  </p:timing>
+</p:sld>
+</file>
+
+<file path=ppt/slides/slide15.xml><?xml version="1.0" encoding="utf-8"?>
+<p:sld xmlns:a="http://schemas.openxmlformats.org/drawingml/2006/main" xmlns:r="http://schemas.openxmlformats.org/officeDocument/2006/relationships" xmlns:p="http://schemas.openxmlformats.org/presentationml/2006/main">
+  <p:cSld>
+    <p:spTree>
+      <p:nvGrpSpPr>
+        <p:cNvPr id="1" name=""/>
+        <p:cNvGrpSpPr/>
+        <p:nvPr/>
+      </p:nvGrpSpPr>
+      <p:grpSpPr>
+        <a:xfrm>
+          <a:off x="0" y="0"/>
+          <a:ext cx="0" cy="0"/>
+          <a:chOff x="0" y="0"/>
+          <a:chExt cx="0" cy="0"/>
+        </a:xfrm>
+      </p:grpSpPr>
+      <p:sp>
+        <p:nvSpPr>
+          <p:cNvPr id="2" name="Título 1"/>
+          <p:cNvSpPr>
+            <a:spLocks noGrp="1"/>
+          </p:cNvSpPr>
+          <p:nvPr>
+            <p:ph type="title"/>
+          </p:nvPr>
+        </p:nvSpPr>
+        <p:spPr/>
+        <p:txBody>
+          <a:bodyPr/>
+          <a:lstStyle/>
+          <a:p>
+            <a:r>
+              <a:rPr lang="en-GB" sz="4800" dirty="0" smtClean="0"/>
+              <a:t>Tools and technologies</a:t>
+            </a:r>
+            <a:endParaRPr lang="en-GB" sz="4800" dirty="0"/>
+          </a:p>
+        </p:txBody>
+      </p:sp>
+      <p:sp>
+        <p:nvSpPr>
+          <p:cNvPr id="10" name="Content Placeholder 9"/>
+          <p:cNvSpPr>
+            <a:spLocks noGrp="1"/>
+          </p:cNvSpPr>
+          <p:nvPr>
+            <p:ph sz="half" idx="2"/>
+          </p:nvPr>
+        </p:nvSpPr>
+        <p:spPr>
+          <a:xfrm>
+            <a:off x="477788" y="1556792"/>
+            <a:ext cx="5400600" cy="4317802"/>
+          </a:xfrm>
+        </p:spPr>
+        <p:txBody>
+          <a:bodyPr>
+            <a:normAutofit/>
+          </a:bodyPr>
+          <a:lstStyle/>
+          <a:p>
+            <a:pPr>
+              <a:spcBef>
+                <a:spcPts val="2400"/>
+              </a:spcBef>
+            </a:pPr>
+            <a:r>
+              <a:rPr lang="en-GB" sz="3600" dirty="0" smtClean="0"/>
+              <a:t>Previous ones </a:t>
+            </a:r>
+            <a:r>
+              <a:rPr lang="en-GB" sz="2400" dirty="0" smtClean="0"/>
+              <a:t>(Java, Continuous integration, Version</a:t>
+            </a:r>
+            <a:r>
+              <a:rPr lang="en-GB" sz="2400" dirty="0" smtClean="0"/>
+              <a:t> Control Flow, </a:t>
+            </a:r>
+            <a:r>
+              <a:rPr lang="en-GB" sz="2400" dirty="0" smtClean="0"/>
+              <a:t>Persistence) </a:t>
+            </a:r>
+          </a:p>
+          <a:p>
+            <a:pPr>
+              <a:spcBef>
+                <a:spcPts val="3000"/>
+              </a:spcBef>
+            </a:pPr>
+            <a:r>
+              <a:rPr lang="en-GB" sz="2400" dirty="0" smtClean="0">
+                <a:ea typeface="Adobe Fan Heiti Std B" panose="020B0700000000000000" pitchFamily="34" charset="-128"/>
+              </a:rPr>
+              <a:t>Interface plugins.</a:t>
+            </a:r>
+          </a:p>
+          <a:p>
+            <a:pPr>
+              <a:spcBef>
+                <a:spcPts val="3000"/>
+              </a:spcBef>
+            </a:pPr>
+            <a:r>
+              <a:rPr lang="en-GB" sz="2400" dirty="0" smtClean="0">
+                <a:ea typeface="Adobe Fan Heiti Std B" panose="020B0700000000000000" pitchFamily="34" charset="-128"/>
+              </a:rPr>
+              <a:t>Testing </a:t>
+            </a:r>
+          </a:p>
+          <a:p>
+            <a:pPr>
+              <a:spcBef>
+                <a:spcPts val="3000"/>
+              </a:spcBef>
+            </a:pPr>
+            <a:r>
+              <a:rPr lang="en-GB" sz="2400" dirty="0" smtClean="0">
+                <a:ea typeface="Adobe Fan Heiti Std B" panose="020B0700000000000000" pitchFamily="34" charset="-128"/>
+              </a:rPr>
+              <a:t>Testing and construction</a:t>
+            </a:r>
+            <a:endParaRPr lang="en-GB" sz="2400" dirty="0">
+              <a:ea typeface="Adobe Fan Heiti Std B" panose="020B0700000000000000" pitchFamily="34" charset="-128"/>
+            </a:endParaRPr>
+          </a:p>
+        </p:txBody>
+      </p:sp>
+      <p:pic>
+        <p:nvPicPr>
+          <p:cNvPr id="3074" name="Picture 2" descr="http://upload.wikimedia.org/wikipedia/commons/thumb/0/0b/Maven_logo.svg/1280px-Maven_logo.svg.png"/>
+          <p:cNvPicPr>
+            <a:picLocks noChangeAspect="1" noChangeArrowheads="1"/>
+          </p:cNvPicPr>
+          <p:nvPr/>
+        </p:nvPicPr>
+        <p:blipFill>
+          <a:blip r:embed="rId3" cstate="print">
+            <a:extLst>
+              <a:ext uri="{28A0092B-C50C-407E-A947-70E740481C1C}">
+                <a14:useLocalDpi xmlns:a14="http://schemas.microsoft.com/office/drawing/2010/main" val="0"/>
+              </a:ext>
+            </a:extLst>
+          </a:blip>
+          <a:srcRect/>
+          <a:stretch>
+            <a:fillRect/>
+          </a:stretch>
+        </p:blipFill>
+        <p:spPr bwMode="auto">
+          <a:xfrm>
+            <a:off x="5590356" y="2124487"/>
+            <a:ext cx="2592288" cy="593391"/>
+          </a:xfrm>
+          <a:prstGeom prst="rect">
+            <a:avLst/>
+          </a:prstGeom>
+          <a:noFill/>
+          <a:extLst>
+            <a:ext uri="{909E8E84-426E-40DD-AFC4-6F175D3DCCD1}">
+              <a14:hiddenFill xmlns:a14="http://schemas.microsoft.com/office/drawing/2010/main">
+                <a:solidFill>
+                  <a:srgbClr val="FFFFFF"/>
+                </a:solidFill>
+              </a14:hiddenFill>
+            </a:ext>
+          </a:extLst>
+        </p:spPr>
+      </p:pic>
+      <p:pic>
+        <p:nvPicPr>
+          <p:cNvPr id="5" name="Imagen 4"/>
+          <p:cNvPicPr>
+            <a:picLocks noChangeAspect="1"/>
+          </p:cNvPicPr>
+          <p:nvPr/>
+        </p:nvPicPr>
+        <p:blipFill>
+          <a:blip r:embed="rId4" cstate="print">
+            <a:extLst>
+              <a:ext uri="{28A0092B-C50C-407E-A947-70E740481C1C}">
+                <a14:useLocalDpi xmlns:a14="http://schemas.microsoft.com/office/drawing/2010/main" val="0"/>
+              </a:ext>
+            </a:extLst>
+          </a:blip>
+          <a:stretch>
+            <a:fillRect/>
+          </a:stretch>
+        </p:blipFill>
+        <p:spPr>
+          <a:xfrm>
+            <a:off x="8780556" y="1668414"/>
+            <a:ext cx="1728192" cy="369667"/>
+          </a:xfrm>
+          <a:prstGeom prst="rect">
+            <a:avLst/>
+          </a:prstGeom>
+        </p:spPr>
+      </p:pic>
+      <p:pic>
+        <p:nvPicPr>
+          <p:cNvPr id="12" name="Picture 2" descr="http://photos3.meetupstatic.com/photos/event/c/9/7/c/highres_14391580.jpeg"/>
+          <p:cNvPicPr>
+            <a:picLocks noChangeAspect="1" noChangeArrowheads="1"/>
+          </p:cNvPicPr>
+          <p:nvPr/>
+        </p:nvPicPr>
+        <p:blipFill>
+          <a:blip r:embed="rId5" cstate="print">
+            <a:extLst>
+              <a:ext uri="{28A0092B-C50C-407E-A947-70E740481C1C}">
+                <a14:useLocalDpi xmlns:a14="http://schemas.microsoft.com/office/drawing/2010/main" val="0"/>
+              </a:ext>
+            </a:extLst>
+          </a:blip>
+          <a:srcRect/>
+          <a:stretch>
+            <a:fillRect/>
+          </a:stretch>
+        </p:blipFill>
+        <p:spPr bwMode="auto">
+          <a:xfrm>
+            <a:off x="8780556" y="2038081"/>
+            <a:ext cx="2309316" cy="679797"/>
+          </a:xfrm>
+          <a:prstGeom prst="rect">
+            <a:avLst/>
+          </a:prstGeom>
+          <a:noFill/>
+          <a:extLst>
+            <a:ext uri="{909E8E84-426E-40DD-AFC4-6F175D3DCCD1}">
+              <a14:hiddenFill xmlns:a14="http://schemas.microsoft.com/office/drawing/2010/main">
+                <a:solidFill>
+                  <a:srgbClr val="FFFFFF"/>
+                </a:solidFill>
+              </a14:hiddenFill>
+            </a:ext>
+          </a:extLst>
+        </p:spPr>
+      </p:pic>
+      <p:pic>
+        <p:nvPicPr>
+          <p:cNvPr id="3" name="Imagen 2"/>
+          <p:cNvPicPr>
+            <a:picLocks noChangeAspect="1"/>
+          </p:cNvPicPr>
+          <p:nvPr/>
+        </p:nvPicPr>
+        <p:blipFill>
+          <a:blip r:embed="rId6" cstate="print">
+            <a:extLst>
+              <a:ext uri="{28A0092B-C50C-407E-A947-70E740481C1C}">
+                <a14:useLocalDpi xmlns:a14="http://schemas.microsoft.com/office/drawing/2010/main" val="0"/>
+              </a:ext>
+            </a:extLst>
+          </a:blip>
+          <a:stretch>
+            <a:fillRect/>
+          </a:stretch>
+        </p:blipFill>
+        <p:spPr>
+          <a:xfrm>
+            <a:off x="5414619" y="1145112"/>
+            <a:ext cx="3231795" cy="1182364"/>
+          </a:xfrm>
+          <a:prstGeom prst="rect">
+            <a:avLst/>
+          </a:prstGeom>
+        </p:spPr>
+      </p:pic>
+      <p:sp>
+        <p:nvSpPr>
+          <p:cNvPr id="8" name="Text Placeholder 3"/>
+          <p:cNvSpPr>
+            <a:spLocks noGrp="1"/>
+          </p:cNvSpPr>
+          <p:nvPr>
+            <p:ph type="body" sz="half" idx="2"/>
+          </p:nvPr>
+        </p:nvSpPr>
+        <p:spPr>
+          <a:xfrm>
+            <a:off x="6187218" y="3111116"/>
+            <a:ext cx="4918392" cy="864112"/>
+          </a:xfrm>
+        </p:spPr>
+        <p:txBody>
+          <a:bodyPr>
+            <a:noAutofit/>
+          </a:bodyPr>
+          <a:lstStyle/>
+          <a:p>
+            <a:pPr marL="0" indent="0">
+              <a:buNone/>
+            </a:pPr>
+            <a:r>
+              <a:rPr lang="en-US" sz="3200" dirty="0" smtClean="0">
+                <a:solidFill>
+                  <a:srgbClr val="FFC000"/>
+                </a:solidFill>
+                <a:latin typeface="Lucida Sans" panose="020B0602030504020204" pitchFamily="34" charset="0"/>
+              </a:rPr>
+              <a:t>Windows Builder </a:t>
+            </a:r>
+            <a:endParaRPr lang="en-US" sz="3200" dirty="0">
+              <a:solidFill>
+                <a:srgbClr val="FFC000"/>
+              </a:solidFill>
+              <a:latin typeface="Lucida Sans" panose="020B0602030504020204" pitchFamily="34" charset="0"/>
+            </a:endParaRPr>
+          </a:p>
+        </p:txBody>
+      </p:sp>
+      <p:pic>
+        <p:nvPicPr>
+          <p:cNvPr id="5122" name="Picture 2" descr="http://andrewvos.com/images/2011/06/cucumber-logo.png"/>
+          <p:cNvPicPr>
+            <a:picLocks noChangeAspect="1" noChangeArrowheads="1"/>
+          </p:cNvPicPr>
+          <p:nvPr/>
+        </p:nvPicPr>
+        <p:blipFill>
+          <a:blip r:embed="rId7">
+            <a:extLst>
+              <a:ext uri="{28A0092B-C50C-407E-A947-70E740481C1C}">
+                <a14:useLocalDpi xmlns:a14="http://schemas.microsoft.com/office/drawing/2010/main" val="0"/>
+              </a:ext>
+            </a:extLst>
+          </a:blip>
+          <a:srcRect/>
+          <a:stretch>
+            <a:fillRect/>
+          </a:stretch>
+        </p:blipFill>
+        <p:spPr bwMode="auto">
+          <a:xfrm>
+            <a:off x="7762001" y="3367380"/>
+            <a:ext cx="3485562" cy="1215696"/>
+          </a:xfrm>
+          <a:prstGeom prst="rect">
+            <a:avLst/>
+          </a:prstGeom>
+          <a:noFill/>
+          <a:extLst>
+            <a:ext uri="{909E8E84-426E-40DD-AFC4-6F175D3DCCD1}">
+              <a14:hiddenFill xmlns:a14="http://schemas.microsoft.com/office/drawing/2010/main">
+                <a:solidFill>
+                  <a:srgbClr val="FFFFFF"/>
+                </a:solidFill>
+              </a14:hiddenFill>
+            </a:ext>
+          </a:extLst>
+        </p:spPr>
+      </p:pic>
+      <p:pic>
+        <p:nvPicPr>
+          <p:cNvPr id="11" name="Picture 6" descr="https://travis-ci.com/img/travis-mascot-200px.png"/>
+          <p:cNvPicPr>
+            <a:picLocks noChangeAspect="1" noChangeArrowheads="1"/>
+          </p:cNvPicPr>
+          <p:nvPr/>
+        </p:nvPicPr>
+        <p:blipFill>
+          <a:blip r:embed="rId8">
+            <a:extLst>
+              <a:ext uri="{28A0092B-C50C-407E-A947-70E740481C1C}">
+                <a14:useLocalDpi xmlns:a14="http://schemas.microsoft.com/office/drawing/2010/main" val="0"/>
+              </a:ext>
+            </a:extLst>
+          </a:blip>
+          <a:srcRect/>
+          <a:stretch>
+            <a:fillRect/>
+          </a:stretch>
+        </p:blipFill>
+        <p:spPr bwMode="auto">
+          <a:xfrm>
+            <a:off x="5826460" y="4149080"/>
+            <a:ext cx="1503011" cy="1488056"/>
+          </a:xfrm>
+          <a:prstGeom prst="rect">
+            <a:avLst/>
+          </a:prstGeom>
+          <a:noFill/>
+          <a:extLst>
+            <a:ext uri="{909E8E84-426E-40DD-AFC4-6F175D3DCCD1}">
+              <a14:hiddenFill xmlns:a14="http://schemas.microsoft.com/office/drawing/2010/main">
+                <a:solidFill>
+                  <a:srgbClr val="FFFFFF"/>
+                </a:solidFill>
+              </a14:hiddenFill>
+            </a:ext>
+          </a:extLst>
+        </p:spPr>
+      </p:pic>
+    </p:spTree>
+    <p:extLst>
+      <p:ext uri="{BB962C8B-B14F-4D97-AF65-F5344CB8AC3E}">
+        <p14:creationId xmlns:p14="http://schemas.microsoft.com/office/powerpoint/2010/main" val="3758709098"/>
+      </p:ext>
+    </p:extLst>
+  </p:cSld>
+  <p:clrMapOvr>
+    <a:masterClrMapping/>
+  </p:clrMapOvr>
+  <mc:AlternateContent xmlns:mc="http://schemas.openxmlformats.org/markup-compatibility/2006" xmlns:p14="http://schemas.microsoft.com/office/powerpoint/2010/main">
+    <mc:Choice Requires="p14">
+      <p:transition spd="med" p14:dur="700">
+        <p:fade/>
+      </p:transition>
+    </mc:Choice>
+    <mc:Fallback xmlns="">
+      <p:transition spd="med">
+        <p:fade/>
+      </p:transition>
+    </mc:Fallback>
+  </mc:AlternateContent>
+  <p:timing>
+    <p:tnLst>
+      <p:par>
+        <p:cTn id="1" dur="indefinite" restart="never" nodeType="tmRoot"/>
+      </p:par>
+    </p:tnLst>
+  </p:timing>
+</p:sld>
+</file>
+
+<file path=ppt/slides/slide16.xml><?xml version="1.0" encoding="utf-8"?>
+<p:sld xmlns:a="http://schemas.openxmlformats.org/drawingml/2006/main" xmlns:r="http://schemas.openxmlformats.org/officeDocument/2006/relationships" xmlns:p="http://schemas.openxmlformats.org/presentationml/2006/main">
+  <p:cSld>
+    <p:spTree>
+      <p:nvGrpSpPr>
+        <p:cNvPr id="1" name=""/>
+        <p:cNvGrpSpPr/>
+        <p:nvPr/>
+      </p:nvGrpSpPr>
+      <p:grpSpPr>
+        <a:xfrm>
+          <a:off x="0" y="0"/>
+          <a:ext cx="0" cy="0"/>
+          <a:chOff x="0" y="0"/>
+          <a:chExt cx="0" cy="0"/>
+        </a:xfrm>
+      </p:grpSpPr>
+      <p:sp>
+        <p:nvSpPr>
+          <p:cNvPr id="2" name="Título 1"/>
+          <p:cNvSpPr>
+            <a:spLocks noGrp="1"/>
+          </p:cNvSpPr>
+          <p:nvPr>
+            <p:ph type="title"/>
+          </p:nvPr>
+        </p:nvSpPr>
+        <p:spPr/>
+        <p:txBody>
+          <a:bodyPr/>
+          <a:lstStyle/>
+          <a:p>
+            <a:r>
+              <a:rPr lang="es-ES" dirty="0" smtClean="0"/>
+              <a:t>VIDEO DE ACCION </a:t>
+            </a:r>
+            <a:endParaRPr lang="es-ES" dirty="0"/>
+          </a:p>
+        </p:txBody>
+      </p:sp>
+    </p:spTree>
+    <p:extLst>
+      <p:ext uri="{BB962C8B-B14F-4D97-AF65-F5344CB8AC3E}">
+        <p14:creationId xmlns:p14="http://schemas.microsoft.com/office/powerpoint/2010/main" val="3745030812"/>
+      </p:ext>
+    </p:extLst>
+  </p:cSld>
+  <p:clrMapOvr>
+    <a:masterClrMapping/>
+  </p:clrMapOvr>
+  <mc:AlternateContent xmlns:mc="http://schemas.openxmlformats.org/markup-compatibility/2006">
+    <mc:Choice xmlns:p14="http://schemas.microsoft.com/office/powerpoint/2010/main" Requires="p14">
+      <p:transition spd="med" p14:dur="700">
+        <p:fade/>
+      </p:transition>
+    </mc:Choice>
+    <mc:Fallback>
+      <p:transition spd="med">
+        <p:fade/>
+      </p:transition>
+    </mc:Fallback>
+  </mc:AlternateContent>
+  <p:timing>
+    <p:tnLst>
+      <p:par>
+        <p:cTn id="1" dur="indefinite" restart="never" nodeType="tmRoot"/>
+      </p:par>
+    </p:tnLst>
+  </p:timing>
+</p:sld>
+</file>
+
+<file path=ppt/slides/slide17.xml><?xml version="1.0" encoding="utf-8"?>
+<p:sld xmlns:a="http://schemas.openxmlformats.org/drawingml/2006/main" xmlns:r="http://schemas.openxmlformats.org/officeDocument/2006/relationships" xmlns:p="http://schemas.openxmlformats.org/presentationml/2006/main">
+  <p:cSld>
+    <p:spTree>
+      <p:nvGrpSpPr>
+        <p:cNvPr id="1" name=""/>
+        <p:cNvGrpSpPr/>
+        <p:nvPr/>
+      </p:nvGrpSpPr>
+      <p:grpSpPr>
+        <a:xfrm>
+          <a:off x="0" y="0"/>
+          <a:ext cx="0" cy="0"/>
+          <a:chOff x="0" y="0"/>
+          <a:chExt cx="0" cy="0"/>
+        </a:xfrm>
+      </p:grpSpPr>
+      <p:sp>
+        <p:nvSpPr>
+          <p:cNvPr id="2" name="Title 1"/>
+          <p:cNvSpPr>
+            <a:spLocks noGrp="1"/>
+          </p:cNvSpPr>
+          <p:nvPr>
+            <p:ph type="ctrTitle"/>
+          </p:nvPr>
+        </p:nvSpPr>
+        <p:spPr/>
+        <p:txBody>
+          <a:bodyPr/>
+          <a:lstStyle/>
+          <a:p>
+            <a:pPr algn="l" defTabSz="1216152">
+              <a:lnSpc>
+                <a:spcPct val="90000"/>
+              </a:lnSpc>
+              <a:spcBef>
+                <a:spcPts val="0"/>
+              </a:spcBef>
+              <a:buNone/>
+            </a:pPr>
+            <a:r>
+              <a:rPr lang="en-GB" sz="5400" dirty="0" smtClean="0">
+                <a:solidFill>
+                  <a:schemeClr val="tx1"/>
+                </a:solidFill>
+                <a:latin typeface="Calibri"/>
+              </a:rPr>
+              <a:t>Third Deliverable :</a:t>
+            </a:r>
+            <a:br>
+              <a:rPr lang="en-GB" sz="5400" dirty="0" smtClean="0">
+                <a:solidFill>
+                  <a:schemeClr val="tx1"/>
+                </a:solidFill>
+                <a:latin typeface="Calibri"/>
+              </a:rPr>
+            </a:br>
+            <a:r>
+              <a:rPr lang="en-GB" sz="8000" dirty="0" smtClean="0">
+                <a:solidFill>
+                  <a:schemeClr val="tx1"/>
+                </a:solidFill>
+                <a:latin typeface="Calibri"/>
+              </a:rPr>
+              <a:t>WEB APPLICATION</a:t>
+            </a:r>
+            <a:endParaRPr lang="en-GB" sz="8000" b="0" i="0" dirty="0">
+              <a:solidFill>
+                <a:schemeClr val="tx1"/>
+              </a:solidFill>
+              <a:latin typeface="Calibri"/>
+            </a:endParaRPr>
+          </a:p>
+        </p:txBody>
+      </p:sp>
+      <p:pic>
+        <p:nvPicPr>
+          <p:cNvPr id="6" name="Imagen 5"/>
+          <p:cNvPicPr>
+            <a:picLocks noChangeAspect="1"/>
+          </p:cNvPicPr>
+          <p:nvPr/>
+        </p:nvPicPr>
+        <p:blipFill>
+          <a:blip r:embed="rId2">
+            <a:extLst>
+              <a:ext uri="{28A0092B-C50C-407E-A947-70E740481C1C}">
+                <a14:useLocalDpi xmlns:a14="http://schemas.microsoft.com/office/drawing/2010/main" val="0"/>
+              </a:ext>
+            </a:extLst>
+          </a:blip>
+          <a:stretch>
+            <a:fillRect/>
+          </a:stretch>
+        </p:blipFill>
+        <p:spPr>
+          <a:xfrm>
+            <a:off x="9514474" y="4777380"/>
+            <a:ext cx="2913621" cy="1671047"/>
+          </a:xfrm>
+          <a:prstGeom prst="rect">
+            <a:avLst/>
+          </a:prstGeom>
+        </p:spPr>
+      </p:pic>
+      <p:sp>
+        <p:nvSpPr>
+          <p:cNvPr id="7" name="Subtitle 4"/>
+          <p:cNvSpPr>
+            <a:spLocks noGrp="1"/>
+          </p:cNvSpPr>
+          <p:nvPr>
+            <p:ph type="subTitle" idx="1"/>
+          </p:nvPr>
+        </p:nvSpPr>
+        <p:spPr>
+          <a:xfrm>
+            <a:off x="88931" y="6186513"/>
+            <a:ext cx="2131446" cy="523828"/>
+          </a:xfrm>
+        </p:spPr>
+        <p:txBody>
+          <a:bodyPr/>
+          <a:lstStyle/>
+          <a:p>
+            <a:pPr>
+              <a:spcBef>
+                <a:spcPts val="0"/>
+              </a:spcBef>
+            </a:pPr>
+            <a:r>
+              <a:rPr lang="es-ES_tradnl" sz="2800" dirty="0">
+                <a:solidFill>
+                  <a:schemeClr val="tx1"/>
+                </a:solidFill>
+                <a:latin typeface="Calibri"/>
+              </a:rPr>
+              <a:t>Trivial </a:t>
+            </a:r>
+            <a:r>
+              <a:rPr lang="es-ES_tradnl" sz="2800" dirty="0" smtClean="0">
+                <a:solidFill>
+                  <a:schemeClr val="tx1"/>
+                </a:solidFill>
+                <a:latin typeface="Calibri"/>
+              </a:rPr>
+              <a:t>i1b</a:t>
+            </a:r>
+            <a:endParaRPr lang="es-ES_tradnl" sz="2800" b="0" i="0" spc="200" baseline="0" dirty="0">
+              <a:solidFill>
+                <a:srgbClr val="009999"/>
+              </a:solidFill>
+            </a:endParaRPr>
+          </a:p>
+        </p:txBody>
+      </p:sp>
+    </p:spTree>
+    <p:extLst>
+      <p:ext uri="{BB962C8B-B14F-4D97-AF65-F5344CB8AC3E}">
+        <p14:creationId xmlns:p14="http://schemas.microsoft.com/office/powerpoint/2010/main" val="3353501265"/>
+      </p:ext>
+    </p:extLst>
+  </p:cSld>
+  <p:clrMapOvr>
+    <a:masterClrMapping/>
+  </p:clrMapOvr>
+  <mc:AlternateContent xmlns:mc="http://schemas.openxmlformats.org/markup-compatibility/2006" xmlns:p14="http://schemas.microsoft.com/office/powerpoint/2010/main">
+    <mc:Choice Requires="p14">
+      <p:transition spd="med" p14:dur="700">
+        <p:fade/>
+      </p:transition>
+    </mc:Choice>
+    <mc:Fallback xmlns="">
+      <p:transition spd="med">
+        <p:fade/>
+      </p:transition>
+    </mc:Fallback>
+  </mc:AlternateContent>
+  <p:timing>
+    <p:tnLst>
+      <p:par>
+        <p:cTn id="1" dur="indefinite" restart="never" nodeType="tmRoot"/>
+      </p:par>
+    </p:tnLst>
+  </p:timing>
+</p:sld>
+</file>
+
+<file path=ppt/slides/slide18.xml><?xml version="1.0" encoding="utf-8"?>
+<p:sld xmlns:a="http://schemas.openxmlformats.org/drawingml/2006/main" xmlns:r="http://schemas.openxmlformats.org/officeDocument/2006/relationships" xmlns:p="http://schemas.openxmlformats.org/presentationml/2006/main">
+  <p:cSld>
+    <p:spTree>
+      <p:nvGrpSpPr>
+        <p:cNvPr id="1" name=""/>
+        <p:cNvGrpSpPr/>
+        <p:nvPr/>
+      </p:nvGrpSpPr>
+      <p:grpSpPr>
+        <a:xfrm>
+          <a:off x="0" y="0"/>
+          <a:ext cx="0" cy="0"/>
+          <a:chOff x="0" y="0"/>
+          <a:chExt cx="0" cy="0"/>
+        </a:xfrm>
+      </p:grpSpPr>
+      <p:sp>
+        <p:nvSpPr>
           <p:cNvPr id="3" name="Title 2"/>
           <p:cNvSpPr>
             <a:spLocks noGrp="1"/>
@@ -8293,7 +10301,7 @@
 </p:sld>
 </file>
 
-<file path=ppt/slides/slide13.xml><?xml version="1.0" encoding="utf-8"?>
+<file path=ppt/slides/slide19.xml><?xml version="1.0" encoding="utf-8"?>
 <p:sld xmlns:a="http://schemas.openxmlformats.org/drawingml/2006/main" xmlns:r="http://schemas.openxmlformats.org/officeDocument/2006/relationships" xmlns:p="http://schemas.openxmlformats.org/presentationml/2006/main">
   <p:cSld>
     <p:spTree>
@@ -8342,211 +10350,6 @@
 </p:sld>
 </file>
 
-<file path=ppt/slides/slide14.xml><?xml version="1.0" encoding="utf-8"?>
-<p:sld xmlns:a="http://schemas.openxmlformats.org/drawingml/2006/main" xmlns:r="http://schemas.openxmlformats.org/officeDocument/2006/relationships" xmlns:p="http://schemas.openxmlformats.org/presentationml/2006/main">
-  <p:cSld>
-    <p:spTree>
-      <p:nvGrpSpPr>
-        <p:cNvPr id="1" name=""/>
-        <p:cNvGrpSpPr/>
-        <p:nvPr/>
-      </p:nvGrpSpPr>
-      <p:grpSpPr>
-        <a:xfrm>
-          <a:off x="0" y="0"/>
-          <a:ext cx="0" cy="0"/>
-          <a:chOff x="0" y="0"/>
-          <a:chExt cx="0" cy="0"/>
-        </a:xfrm>
-      </p:grpSpPr>
-      <p:sp>
-        <p:nvSpPr>
-          <p:cNvPr id="2" name="Title 1"/>
-          <p:cNvSpPr>
-            <a:spLocks noGrp="1"/>
-          </p:cNvSpPr>
-          <p:nvPr>
-            <p:ph type="title"/>
-          </p:nvPr>
-        </p:nvSpPr>
-        <p:spPr/>
-        <p:txBody>
-          <a:bodyPr/>
-          <a:lstStyle/>
-          <a:p>
-            <a:endParaRPr lang="en-US"/>
-          </a:p>
-        </p:txBody>
-      </p:sp>
-      <p:sp>
-        <p:nvSpPr>
-          <p:cNvPr id="3" name="Content Placeholder 2"/>
-          <p:cNvSpPr>
-            <a:spLocks noGrp="1"/>
-          </p:cNvSpPr>
-          <p:nvPr>
-            <p:ph idx="1"/>
-          </p:nvPr>
-        </p:nvSpPr>
-        <p:spPr/>
-        <p:txBody>
-          <a:bodyPr/>
-          <a:lstStyle/>
-          <a:p>
-            <a:endParaRPr lang="en-US"/>
-          </a:p>
-        </p:txBody>
-      </p:sp>
-      <p:sp>
-        <p:nvSpPr>
-          <p:cNvPr id="4" name="Text Placeholder 3"/>
-          <p:cNvSpPr>
-            <a:spLocks noGrp="1"/>
-          </p:cNvSpPr>
-          <p:nvPr>
-            <p:ph type="body" sz="half" idx="2"/>
-          </p:nvPr>
-        </p:nvSpPr>
-        <p:spPr/>
-        <p:txBody>
-          <a:bodyPr/>
-          <a:lstStyle/>
-          <a:p>
-            <a:endParaRPr lang="en-US"/>
-          </a:p>
-        </p:txBody>
-      </p:sp>
-    </p:spTree>
-    <p:extLst>
-      <p:ext uri="{BB962C8B-B14F-4D97-AF65-F5344CB8AC3E}">
-        <p14:creationId xmlns:p14="http://schemas.microsoft.com/office/powerpoint/2010/main" val="2319046984"/>
-      </p:ext>
-    </p:extLst>
-  </p:cSld>
-  <p:clrMapOvr>
-    <a:masterClrMapping/>
-  </p:clrMapOvr>
-  <mc:AlternateContent xmlns:mc="http://schemas.openxmlformats.org/markup-compatibility/2006" xmlns:p14="http://schemas.microsoft.com/office/powerpoint/2010/main">
-    <mc:Choice Requires="p14">
-      <p:transition spd="med" p14:dur="700">
-        <p:fade/>
-      </p:transition>
-    </mc:Choice>
-    <mc:Fallback xmlns="">
-      <p:transition spd="med">
-        <p:fade/>
-      </p:transition>
-    </mc:Fallback>
-  </mc:AlternateContent>
-  <p:timing>
-    <p:tnLst>
-      <p:par>
-        <p:cTn id="1" dur="indefinite" restart="never" nodeType="tmRoot"/>
-      </p:par>
-    </p:tnLst>
-  </p:timing>
-</p:sld>
-</file>
-
-<file path=ppt/slides/slide15.xml><?xml version="1.0" encoding="utf-8"?>
-<p:sld xmlns:a="http://schemas.openxmlformats.org/drawingml/2006/main" xmlns:r="http://schemas.openxmlformats.org/officeDocument/2006/relationships" xmlns:p="http://schemas.openxmlformats.org/presentationml/2006/main">
-  <p:cSld>
-    <p:spTree>
-      <p:nvGrpSpPr>
-        <p:cNvPr id="1" name=""/>
-        <p:cNvGrpSpPr/>
-        <p:nvPr/>
-      </p:nvGrpSpPr>
-      <p:grpSpPr>
-        <a:xfrm>
-          <a:off x="0" y="0"/>
-          <a:ext cx="0" cy="0"/>
-          <a:chOff x="0" y="0"/>
-          <a:chExt cx="0" cy="0"/>
-        </a:xfrm>
-      </p:grpSpPr>
-      <p:sp>
-        <p:nvSpPr>
-          <p:cNvPr id="3" name="Title 2"/>
-          <p:cNvSpPr>
-            <a:spLocks noGrp="1"/>
-          </p:cNvSpPr>
-          <p:nvPr>
-            <p:ph type="title"/>
-          </p:nvPr>
-        </p:nvSpPr>
-        <p:spPr/>
-        <p:txBody>
-          <a:bodyPr/>
-          <a:lstStyle/>
-          <a:p>
-            <a:endParaRPr lang="en-US" dirty="0"/>
-          </a:p>
-        </p:txBody>
-      </p:sp>
-      <p:sp>
-        <p:nvSpPr>
-          <p:cNvPr id="6" name="Picture Placeholder 5"/>
-          <p:cNvSpPr>
-            <a:spLocks noGrp="1"/>
-          </p:cNvSpPr>
-          <p:nvPr>
-            <p:ph type="pic" idx="1"/>
-          </p:nvPr>
-        </p:nvSpPr>
-        <p:spPr/>
-      </p:sp>
-      <p:sp>
-        <p:nvSpPr>
-          <p:cNvPr id="5" name="Text Placeholder 4"/>
-          <p:cNvSpPr>
-            <a:spLocks noGrp="1"/>
-          </p:cNvSpPr>
-          <p:nvPr>
-            <p:ph type="body" sz="half" idx="2"/>
-          </p:nvPr>
-        </p:nvSpPr>
-        <p:spPr/>
-        <p:txBody>
-          <a:bodyPr/>
-          <a:lstStyle/>
-          <a:p>
-            <a:endParaRPr lang="en-US" dirty="0"/>
-          </a:p>
-        </p:txBody>
-      </p:sp>
-    </p:spTree>
-    <p:extLst>
-      <p:ext uri="{BB962C8B-B14F-4D97-AF65-F5344CB8AC3E}">
-        <p14:creationId xmlns:p14="http://schemas.microsoft.com/office/powerpoint/2010/main" val="3480339974"/>
-      </p:ext>
-    </p:extLst>
-  </p:cSld>
-  <p:clrMapOvr>
-    <a:masterClrMapping/>
-  </p:clrMapOvr>
-  <mc:AlternateContent xmlns:mc="http://schemas.openxmlformats.org/markup-compatibility/2006" xmlns:p14="http://schemas.microsoft.com/office/powerpoint/2010/main">
-    <mc:Choice Requires="p14">
-      <p:transition spd="med" p14:dur="700">
-        <p:fade/>
-      </p:transition>
-    </mc:Choice>
-    <mc:Fallback xmlns="">
-      <p:transition spd="med">
-        <p:fade/>
-      </p:transition>
-    </mc:Fallback>
-  </mc:AlternateContent>
-  <p:timing>
-    <p:tnLst>
-      <p:par>
-        <p:cTn id="1" dur="indefinite" restart="never" nodeType="tmRoot"/>
-      </p:par>
-    </p:tnLst>
-  </p:timing>
-</p:sld>
-</file>
-
 <file path=ppt/slides/slide2.xml><?xml version="1.0" encoding="utf-8"?>
 <p:sld xmlns:a="http://schemas.openxmlformats.org/drawingml/2006/main" xmlns:r="http://schemas.openxmlformats.org/officeDocument/2006/relationships" xmlns:p="http://schemas.openxmlformats.org/presentationml/2006/main">
   <p:cSld>
@@ -8633,6 +10436,211 @@
       </p:transition>
     </mc:Choice>
     <mc:Fallback>
+      <p:transition spd="med">
+        <p:fade/>
+      </p:transition>
+    </mc:Fallback>
+  </mc:AlternateContent>
+  <p:timing>
+    <p:tnLst>
+      <p:par>
+        <p:cTn id="1" dur="indefinite" restart="never" nodeType="tmRoot"/>
+      </p:par>
+    </p:tnLst>
+  </p:timing>
+</p:sld>
+</file>
+
+<file path=ppt/slides/slide20.xml><?xml version="1.0" encoding="utf-8"?>
+<p:sld xmlns:a="http://schemas.openxmlformats.org/drawingml/2006/main" xmlns:r="http://schemas.openxmlformats.org/officeDocument/2006/relationships" xmlns:p="http://schemas.openxmlformats.org/presentationml/2006/main">
+  <p:cSld>
+    <p:spTree>
+      <p:nvGrpSpPr>
+        <p:cNvPr id="1" name=""/>
+        <p:cNvGrpSpPr/>
+        <p:nvPr/>
+      </p:nvGrpSpPr>
+      <p:grpSpPr>
+        <a:xfrm>
+          <a:off x="0" y="0"/>
+          <a:ext cx="0" cy="0"/>
+          <a:chOff x="0" y="0"/>
+          <a:chExt cx="0" cy="0"/>
+        </a:xfrm>
+      </p:grpSpPr>
+      <p:sp>
+        <p:nvSpPr>
+          <p:cNvPr id="2" name="Title 1"/>
+          <p:cNvSpPr>
+            <a:spLocks noGrp="1"/>
+          </p:cNvSpPr>
+          <p:nvPr>
+            <p:ph type="title"/>
+          </p:nvPr>
+        </p:nvSpPr>
+        <p:spPr/>
+        <p:txBody>
+          <a:bodyPr/>
+          <a:lstStyle/>
+          <a:p>
+            <a:endParaRPr lang="en-US"/>
+          </a:p>
+        </p:txBody>
+      </p:sp>
+      <p:sp>
+        <p:nvSpPr>
+          <p:cNvPr id="3" name="Content Placeholder 2"/>
+          <p:cNvSpPr>
+            <a:spLocks noGrp="1"/>
+          </p:cNvSpPr>
+          <p:nvPr>
+            <p:ph idx="1"/>
+          </p:nvPr>
+        </p:nvSpPr>
+        <p:spPr/>
+        <p:txBody>
+          <a:bodyPr/>
+          <a:lstStyle/>
+          <a:p>
+            <a:endParaRPr lang="en-US"/>
+          </a:p>
+        </p:txBody>
+      </p:sp>
+      <p:sp>
+        <p:nvSpPr>
+          <p:cNvPr id="4" name="Text Placeholder 3"/>
+          <p:cNvSpPr>
+            <a:spLocks noGrp="1"/>
+          </p:cNvSpPr>
+          <p:nvPr>
+            <p:ph type="body" sz="half" idx="2"/>
+          </p:nvPr>
+        </p:nvSpPr>
+        <p:spPr/>
+        <p:txBody>
+          <a:bodyPr/>
+          <a:lstStyle/>
+          <a:p>
+            <a:endParaRPr lang="en-US" dirty="0"/>
+          </a:p>
+        </p:txBody>
+      </p:sp>
+    </p:spTree>
+    <p:extLst>
+      <p:ext uri="{BB962C8B-B14F-4D97-AF65-F5344CB8AC3E}">
+        <p14:creationId xmlns:p14="http://schemas.microsoft.com/office/powerpoint/2010/main" val="2319046984"/>
+      </p:ext>
+    </p:extLst>
+  </p:cSld>
+  <p:clrMapOvr>
+    <a:masterClrMapping/>
+  </p:clrMapOvr>
+  <mc:AlternateContent xmlns:mc="http://schemas.openxmlformats.org/markup-compatibility/2006" xmlns:p14="http://schemas.microsoft.com/office/powerpoint/2010/main">
+    <mc:Choice Requires="p14">
+      <p:transition spd="med" p14:dur="700">
+        <p:fade/>
+      </p:transition>
+    </mc:Choice>
+    <mc:Fallback xmlns="">
+      <p:transition spd="med">
+        <p:fade/>
+      </p:transition>
+    </mc:Fallback>
+  </mc:AlternateContent>
+  <p:timing>
+    <p:tnLst>
+      <p:par>
+        <p:cTn id="1" dur="indefinite" restart="never" nodeType="tmRoot"/>
+      </p:par>
+    </p:tnLst>
+  </p:timing>
+</p:sld>
+</file>
+
+<file path=ppt/slides/slide21.xml><?xml version="1.0" encoding="utf-8"?>
+<p:sld xmlns:a="http://schemas.openxmlformats.org/drawingml/2006/main" xmlns:r="http://schemas.openxmlformats.org/officeDocument/2006/relationships" xmlns:p="http://schemas.openxmlformats.org/presentationml/2006/main">
+  <p:cSld>
+    <p:spTree>
+      <p:nvGrpSpPr>
+        <p:cNvPr id="1" name=""/>
+        <p:cNvGrpSpPr/>
+        <p:nvPr/>
+      </p:nvGrpSpPr>
+      <p:grpSpPr>
+        <a:xfrm>
+          <a:off x="0" y="0"/>
+          <a:ext cx="0" cy="0"/>
+          <a:chOff x="0" y="0"/>
+          <a:chExt cx="0" cy="0"/>
+        </a:xfrm>
+      </p:grpSpPr>
+      <p:sp>
+        <p:nvSpPr>
+          <p:cNvPr id="3" name="Title 2"/>
+          <p:cNvSpPr>
+            <a:spLocks noGrp="1"/>
+          </p:cNvSpPr>
+          <p:nvPr>
+            <p:ph type="title"/>
+          </p:nvPr>
+        </p:nvSpPr>
+        <p:spPr/>
+        <p:txBody>
+          <a:bodyPr/>
+          <a:lstStyle/>
+          <a:p>
+            <a:endParaRPr lang="en-US" dirty="0"/>
+          </a:p>
+        </p:txBody>
+      </p:sp>
+      <p:sp>
+        <p:nvSpPr>
+          <p:cNvPr id="6" name="Picture Placeholder 5"/>
+          <p:cNvSpPr>
+            <a:spLocks noGrp="1"/>
+          </p:cNvSpPr>
+          <p:nvPr>
+            <p:ph type="pic" idx="1"/>
+          </p:nvPr>
+        </p:nvSpPr>
+        <p:spPr/>
+      </p:sp>
+      <p:sp>
+        <p:nvSpPr>
+          <p:cNvPr id="5" name="Text Placeholder 4"/>
+          <p:cNvSpPr>
+            <a:spLocks noGrp="1"/>
+          </p:cNvSpPr>
+          <p:nvPr>
+            <p:ph type="body" sz="half" idx="2"/>
+          </p:nvPr>
+        </p:nvSpPr>
+        <p:spPr/>
+        <p:txBody>
+          <a:bodyPr/>
+          <a:lstStyle/>
+          <a:p>
+            <a:endParaRPr lang="en-US" dirty="0"/>
+          </a:p>
+        </p:txBody>
+      </p:sp>
+    </p:spTree>
+    <p:extLst>
+      <p:ext uri="{BB962C8B-B14F-4D97-AF65-F5344CB8AC3E}">
+        <p14:creationId xmlns:p14="http://schemas.microsoft.com/office/powerpoint/2010/main" val="3480339974"/>
+      </p:ext>
+    </p:extLst>
+  </p:cSld>
+  <p:clrMapOvr>
+    <a:masterClrMapping/>
+  </p:clrMapOvr>
+  <mc:AlternateContent xmlns:mc="http://schemas.openxmlformats.org/markup-compatibility/2006" xmlns:p14="http://schemas.microsoft.com/office/powerpoint/2010/main">
+    <mc:Choice Requires="p14">
+      <p:transition spd="med" p14:dur="700">
+        <p:fade/>
+      </p:transition>
+    </mc:Choice>
+    <mc:Fallback xmlns="">
       <p:transition spd="med">
         <p:fade/>
       </p:transition>
@@ -9748,8 +11756,8 @@
         </p:nvSpPr>
         <p:spPr>
           <a:xfrm>
-            <a:off x="837828" y="2132856"/>
-            <a:ext cx="4395194" cy="3741738"/>
+            <a:off x="837828" y="1556792"/>
+            <a:ext cx="4395194" cy="4317802"/>
           </a:xfrm>
         </p:spPr>
         <p:txBody>
@@ -9757,6 +11765,17 @@
             <a:normAutofit/>
           </a:bodyPr>
           <a:lstStyle/>
+          <a:p>
+            <a:pPr>
+              <a:spcBef>
+                <a:spcPts val="2400"/>
+              </a:spcBef>
+            </a:pPr>
+            <a:r>
+              <a:rPr lang="en-US" sz="3600" dirty="0" smtClean="0"/>
+              <a:t>Language </a:t>
+            </a:r>
+          </a:p>
           <a:p>
             <a:pPr>
               <a:spcBef>
@@ -9816,7 +11835,7 @@
         </p:blipFill>
         <p:spPr bwMode="auto">
           <a:xfrm>
-            <a:off x="5662364" y="2105277"/>
+            <a:off x="5662364" y="2231292"/>
             <a:ext cx="5029027" cy="1151176"/>
           </a:xfrm>
           <a:prstGeom prst="rect">
@@ -9856,7 +11875,7 @@
         </p:blipFill>
         <p:spPr>
           <a:xfrm>
-            <a:off x="6382444" y="3508482"/>
+            <a:off x="6382444" y="3571489"/>
             <a:ext cx="3905220" cy="835341"/>
           </a:xfrm>
           <a:prstGeom prst="rect">
@@ -9903,6 +11922,36 @@
               </a14:hiddenFill>
             </a:ext>
           </a:extLst>
+        </p:spPr>
+      </p:pic>
+      <p:pic>
+        <p:nvPicPr>
+          <p:cNvPr id="14" name="Imagen 13"/>
+          <p:cNvPicPr>
+            <a:picLocks noChangeAspect="1"/>
+          </p:cNvPicPr>
+          <p:nvPr/>
+        </p:nvPicPr>
+        <p:blipFill>
+          <a:blip r:embed="rId6">
+            <a:extLst>
+              <a:ext uri="{28A0092B-C50C-407E-A947-70E740481C1C}">
+                <a14:useLocalDpi xmlns:a14="http://schemas.microsoft.com/office/drawing/2010/main" val="0"/>
+              </a:ext>
+            </a:extLst>
+          </a:blip>
+          <a:stretch>
+            <a:fillRect/>
+          </a:stretch>
+        </p:blipFill>
+        <p:spPr>
+          <a:xfrm>
+            <a:off x="6072493" y="942217"/>
+            <a:ext cx="4618898" cy="1689841"/>
+          </a:xfrm>
+          <a:prstGeom prst="rect">
+            <a:avLst/>
+          </a:prstGeom>
         </p:spPr>
       </p:pic>
     </p:spTree>

</xml_diff>

<commit_message>
Added quality attributes on the slides
</commit_message>
<xml_diff>
--- a/Documentation/Software Architecture.pptx
+++ b/Documentation/Software Architecture.pptx
@@ -161,7 +161,7 @@
       </p14:sectionLst>
     </p:ext>
     <p:ext uri="{EFAFB233-063F-42B5-8137-9DF3F51BA10A}">
-      <p15:sldGuideLst xmlns:p15="http://schemas.microsoft.com/office/powerpoint/2012/main">
+      <p15:sldGuideLst xmlns:p15="http://schemas.microsoft.com/office/powerpoint/2012/main" xmlns="">
         <p15:guide id="1" orient="horz" pos="2160">
           <p15:clr>
             <a:srgbClr val="A4A3A4"/>
@@ -200,7 +200,7 @@
       </p15:sldGuideLst>
     </p:ext>
     <p:ext uri="{2D200454-40CA-4A62-9FC3-DE9A4176ACB9}">
-      <p15:notesGuideLst xmlns:p15="http://schemas.microsoft.com/office/powerpoint/2012/main">
+      <p15:notesGuideLst xmlns:p15="http://schemas.microsoft.com/office/powerpoint/2012/main" xmlns="">
         <p15:guide id="1" orient="horz" pos="2880">
           <p15:clr>
             <a:srgbClr val="A4A3A4"/>
@@ -299,7 +299,7 @@
           <a:p>
             <a:fld id="{FE5B4EDC-59C0-49C7-8ADA-5A781B329E02}" type="datetimeFigureOut">
               <a:rPr lang="es-ES"/>
-              <a:t>09/05/2015</a:t>
+              <a:t>10/05/2015</a:t>
             </a:fld>
             <a:endParaRPr/>
           </a:p>
@@ -464,7 +464,7 @@
           <a:p>
             <a:fld id="{F2D8D46A-B586-417D-BFBD-8C8FE0AAF762}" type="datetimeFigureOut">
               <a:rPr lang="es-ES"/>
-              <a:t>09/05/2015</a:t>
+              <a:t>10/05/2015</a:t>
             </a:fld>
             <a:endParaRPr/>
           </a:p>
@@ -1346,7 +1346,7 @@
       </p:grpSpPr>
       <p:sp>
         <p:nvSpPr>
-          <p:cNvPr id="2" name="Marcador de imagen de diapositiva 1"/>
+          <p:cNvPr id="2" name="1 Marcador de imagen de diapositiva"/>
           <p:cNvSpPr>
             <a:spLocks noGrp="1" noRot="1" noChangeAspect="1"/>
           </p:cNvSpPr>
@@ -1358,7 +1358,7 @@
       </p:sp>
       <p:sp>
         <p:nvSpPr>
-          <p:cNvPr id="3" name="Marcador de notas 2"/>
+          <p:cNvPr id="3" name="2 Marcador de notas"/>
           <p:cNvSpPr>
             <a:spLocks noGrp="1"/>
           </p:cNvSpPr>
@@ -1372,56 +1372,187 @@
           <a:lstStyle/>
           <a:p>
             <a:r>
+              <a:rPr lang="es-ES" dirty="0" smtClean="0"/>
+              <a:t>Input </a:t>
+            </a:r>
+            <a:r>
               <a:rPr lang="es-ES" dirty="0" err="1" smtClean="0"/>
-              <a:t>Parser</a:t>
+              <a:t>commands</a:t>
             </a:r>
             <a:r>
               <a:rPr lang="es-ES" dirty="0" smtClean="0"/>
-              <a:t> lo</a:t>
+              <a:t> </a:t>
+            </a:r>
+            <a:r>
+              <a:rPr lang="es-ES" dirty="0" err="1" smtClean="0"/>
+              <a:t>make</a:t>
+            </a:r>
+            <a:r>
+              <a:rPr lang="es-ES" dirty="0" smtClean="0"/>
+              <a:t> </a:t>
+            </a:r>
+            <a:r>
+              <a:rPr lang="es-ES" dirty="0" err="1" smtClean="0"/>
+              <a:t>it</a:t>
+            </a:r>
+            <a:r>
+              <a:rPr lang="es-ES" dirty="0" smtClean="0"/>
+              <a:t> </a:t>
+            </a:r>
+            <a:r>
+              <a:rPr lang="es-ES" dirty="0" err="1" smtClean="0"/>
+              <a:t>easy</a:t>
+            </a:r>
+            <a:r>
+              <a:rPr lang="es-ES" dirty="0" smtClean="0"/>
+              <a:t> and</a:t>
             </a:r>
             <a:r>
               <a:rPr lang="es-ES" baseline="0" dirty="0" smtClean="0"/>
-              <a:t> lleva a cabo </a:t>
+              <a:t> </a:t>
             </a:r>
             <a:r>
               <a:rPr lang="es-ES" baseline="0" dirty="0" err="1" smtClean="0"/>
-              <a:t>parser</a:t>
+              <a:t>fast</a:t>
             </a:r>
             <a:r>
               <a:rPr lang="es-ES" baseline="0" dirty="0" smtClean="0"/>
-              <a:t>, pero </a:t>
+              <a:t> to use, </a:t>
             </a:r>
             <a:r>
               <a:rPr lang="es-ES" baseline="0" dirty="0" err="1" smtClean="0"/>
-              <a:t>Processing</a:t>
+              <a:t>the</a:t>
             </a:r>
             <a:r>
               <a:rPr lang="es-ES" baseline="0" dirty="0" smtClean="0"/>
-              <a:t> y </a:t>
+              <a:t> </a:t>
             </a:r>
             <a:r>
               <a:rPr lang="es-ES" baseline="0" dirty="0" err="1" smtClean="0"/>
-              <a:t>Persist</a:t>
+              <a:t>process</a:t>
             </a:r>
             <a:r>
               <a:rPr lang="es-ES" baseline="0" dirty="0" smtClean="0"/>
-              <a:t> lo lleva a cabo DB </a:t>
+              <a:t> </a:t>
             </a:r>
             <a:r>
               <a:rPr lang="es-ES" baseline="0" dirty="0" err="1" smtClean="0"/>
-              <a:t>Writter</a:t>
+              <a:t>could</a:t>
             </a:r>
             <a:r>
               <a:rPr lang="es-ES" baseline="0" dirty="0" smtClean="0"/>
-              <a:t>, que recibe una colección de preguntas y cambia su formato para subirlas a la base de datos. </a:t>
-            </a:r>
-            <a:endParaRPr lang="es-ES" dirty="0"/>
-          </a:p>
-        </p:txBody>
-      </p:sp>
-      <p:sp>
-        <p:nvSpPr>
-          <p:cNvPr id="4" name="Marcador de número de diapositiva 3"/>
+              <a:t> be </a:t>
+            </a:r>
+            <a:r>
+              <a:rPr lang="es-ES" baseline="0" dirty="0" err="1" smtClean="0"/>
+              <a:t>automated</a:t>
+            </a:r>
+            <a:r>
+              <a:rPr lang="es-ES" baseline="0" dirty="0" smtClean="0"/>
+              <a:t> and </a:t>
+            </a:r>
+            <a:r>
+              <a:rPr lang="es-ES" baseline="0" dirty="0" err="1" smtClean="0"/>
+              <a:t>doesn’t</a:t>
+            </a:r>
+            <a:r>
+              <a:rPr lang="es-ES" baseline="0" dirty="0" smtClean="0"/>
+              <a:t> </a:t>
+            </a:r>
+            <a:r>
+              <a:rPr lang="es-ES" baseline="0" dirty="0" err="1" smtClean="0"/>
+              <a:t>require</a:t>
+            </a:r>
+            <a:r>
+              <a:rPr lang="es-ES" baseline="0" dirty="0" smtClean="0"/>
+              <a:t> </a:t>
+            </a:r>
+            <a:r>
+              <a:rPr lang="es-ES" baseline="0" dirty="0" err="1" smtClean="0"/>
+              <a:t>the</a:t>
+            </a:r>
+            <a:r>
+              <a:rPr lang="es-ES" baseline="0" dirty="0" smtClean="0"/>
+              <a:t> </a:t>
+            </a:r>
+            <a:r>
+              <a:rPr lang="es-ES" baseline="0" dirty="0" err="1" smtClean="0"/>
+              <a:t>user</a:t>
+            </a:r>
+            <a:r>
+              <a:rPr lang="es-ES" baseline="0" dirty="0" smtClean="0"/>
+              <a:t> to </a:t>
+            </a:r>
+            <a:r>
+              <a:rPr lang="es-ES" baseline="0" dirty="0" err="1" smtClean="0"/>
+              <a:t>learn</a:t>
+            </a:r>
+            <a:r>
+              <a:rPr lang="es-ES" baseline="0" dirty="0" smtClean="0"/>
+              <a:t> </a:t>
+            </a:r>
+            <a:r>
+              <a:rPr lang="es-ES" baseline="0" dirty="0" err="1" smtClean="0"/>
+              <a:t>much</a:t>
+            </a:r>
+            <a:r>
+              <a:rPr lang="es-ES" baseline="0" dirty="0" smtClean="0"/>
+              <a:t> </a:t>
+            </a:r>
+            <a:r>
+              <a:rPr lang="es-ES" baseline="0" dirty="0" err="1" smtClean="0"/>
+              <a:t>before</a:t>
+            </a:r>
+            <a:r>
+              <a:rPr lang="es-ES" baseline="0" dirty="0" smtClean="0"/>
+              <a:t> </a:t>
+            </a:r>
+            <a:r>
+              <a:rPr lang="es-ES" baseline="0" dirty="0" err="1" smtClean="0"/>
+              <a:t>being</a:t>
+            </a:r>
+            <a:r>
+              <a:rPr lang="es-ES" baseline="0" dirty="0" smtClean="0"/>
+              <a:t> </a:t>
+            </a:r>
+            <a:r>
+              <a:rPr lang="es-ES" baseline="0" dirty="0" err="1" smtClean="0"/>
+              <a:t>able</a:t>
+            </a:r>
+            <a:r>
+              <a:rPr lang="es-ES" baseline="0" dirty="0" smtClean="0"/>
+              <a:t> to </a:t>
+            </a:r>
+            <a:r>
+              <a:rPr lang="es-ES" baseline="0" dirty="0" err="1" smtClean="0"/>
+              <a:t>work</a:t>
+            </a:r>
+            <a:r>
+              <a:rPr lang="es-ES" baseline="0" dirty="0" smtClean="0"/>
+              <a:t> </a:t>
+            </a:r>
+            <a:r>
+              <a:rPr lang="es-ES" baseline="0" dirty="0" err="1" smtClean="0"/>
+              <a:t>with</a:t>
+            </a:r>
+            <a:r>
+              <a:rPr lang="es-ES" baseline="0" dirty="0" smtClean="0"/>
+              <a:t> </a:t>
+            </a:r>
+            <a:r>
+              <a:rPr lang="es-ES" baseline="0" dirty="0" err="1" smtClean="0"/>
+              <a:t>it</a:t>
+            </a:r>
+            <a:r>
+              <a:rPr lang="es-ES" baseline="0" dirty="0" smtClean="0"/>
+              <a:t>.</a:t>
+            </a:r>
+          </a:p>
+        </p:txBody>
+      </p:sp>
+      <p:sp>
+        <p:nvSpPr>
+          <p:cNvPr id="4" name="3 Marcador de número de diapositiva"/>
           <p:cNvSpPr>
             <a:spLocks noGrp="1"/>
           </p:cNvSpPr>
@@ -1436,7 +1567,7 @@
           <a:p>
             <a:fld id="{3EBA5BD7-F043-4D1B-AA17-CD412FC534DE}" type="slidenum">
               <a:rPr lang="es-ES" smtClean="0"/>
-              <a:t>8</a:t>
+              <a:t>7</a:t>
             </a:fld>
             <a:endParaRPr lang="es-ES"/>
           </a:p>
@@ -1445,7 +1576,7 @@
     </p:spTree>
     <p:extLst>
       <p:ext uri="{BB962C8B-B14F-4D97-AF65-F5344CB8AC3E}">
-        <p14:creationId xmlns:p14="http://schemas.microsoft.com/office/powerpoint/2010/main" val="3314713159"/>
+        <p14:creationId xmlns:p14="http://schemas.microsoft.com/office/powerpoint/2010/main" val="486887078"/>
       </p:ext>
     </p:extLst>
   </p:cSld>
@@ -1500,14 +1631,50 @@
           <a:lstStyle/>
           <a:p>
             <a:r>
-              <a:rPr lang="en-GB" noProof="0" dirty="0" smtClean="0"/>
-              <a:t>Explain: This</a:t>
-            </a:r>
-            <a:r>
-              <a:rPr lang="en-GB" baseline="0" noProof="0" dirty="0" smtClean="0"/>
-              <a:t> second deliverable its a desktop application to play Trivial. The principal restrictions are that the users have to be registered to play and the admin has access to all the statistics of the games and users. </a:t>
-            </a:r>
-            <a:endParaRPr lang="en-GB" noProof="0" dirty="0"/>
+              <a:rPr lang="es-ES" dirty="0" err="1" smtClean="0"/>
+              <a:t>Parser</a:t>
+            </a:r>
+            <a:r>
+              <a:rPr lang="es-ES" dirty="0" smtClean="0"/>
+              <a:t> lo</a:t>
+            </a:r>
+            <a:r>
+              <a:rPr lang="es-ES" baseline="0" dirty="0" smtClean="0"/>
+              <a:t> lleva a cabo </a:t>
+            </a:r>
+            <a:r>
+              <a:rPr lang="es-ES" baseline="0" dirty="0" err="1" smtClean="0"/>
+              <a:t>parser</a:t>
+            </a:r>
+            <a:r>
+              <a:rPr lang="es-ES" baseline="0" dirty="0" smtClean="0"/>
+              <a:t>, pero </a:t>
+            </a:r>
+            <a:r>
+              <a:rPr lang="es-ES" baseline="0" dirty="0" err="1" smtClean="0"/>
+              <a:t>Processing</a:t>
+            </a:r>
+            <a:r>
+              <a:rPr lang="es-ES" baseline="0" dirty="0" smtClean="0"/>
+              <a:t> y </a:t>
+            </a:r>
+            <a:r>
+              <a:rPr lang="es-ES" baseline="0" dirty="0" err="1" smtClean="0"/>
+              <a:t>Persist</a:t>
+            </a:r>
+            <a:r>
+              <a:rPr lang="es-ES" baseline="0" dirty="0" smtClean="0"/>
+              <a:t> lo lleva a cabo DB </a:t>
+            </a:r>
+            <a:r>
+              <a:rPr lang="es-ES" baseline="0" dirty="0" err="1" smtClean="0"/>
+              <a:t>Writter</a:t>
+            </a:r>
+            <a:r>
+              <a:rPr lang="es-ES" baseline="0" dirty="0" smtClean="0"/>
+              <a:t>, que recibe una colección de preguntas y cambia su formato para subirlas a la base de datos. </a:t>
+            </a:r>
+            <a:endParaRPr lang="es-ES" dirty="0"/>
           </a:p>
         </p:txBody>
       </p:sp>
@@ -1528,7 +1695,7 @@
           <a:p>
             <a:fld id="{3EBA5BD7-F043-4D1B-AA17-CD412FC534DE}" type="slidenum">
               <a:rPr lang="es-ES" smtClean="0"/>
-              <a:t>11</a:t>
+              <a:t>8</a:t>
             </a:fld>
             <a:endParaRPr lang="es-ES"/>
           </a:p>
@@ -1537,7 +1704,7 @@
     </p:spTree>
     <p:extLst>
       <p:ext uri="{BB962C8B-B14F-4D97-AF65-F5344CB8AC3E}">
-        <p14:creationId xmlns:p14="http://schemas.microsoft.com/office/powerpoint/2010/main" val="3184010729"/>
+        <p14:creationId xmlns:p14="http://schemas.microsoft.com/office/powerpoint/2010/main" val="3314713159"/>
       </p:ext>
     </p:extLst>
   </p:cSld>
@@ -1592,36 +1759,14 @@
           <a:lstStyle/>
           <a:p>
             <a:r>
-              <a:rPr lang="en-US" dirty="0" smtClean="0"/>
-              <a:t>In this deliverable we fulfil the approach of a MVC. There are three main different parts. </a:t>
-            </a:r>
-          </a:p>
-          <a:p>
-            <a:r>
-              <a:rPr lang="en-US" dirty="0" smtClean="0"/>
-              <a:t>The model that contains the business logic and the records the status. It's independent from the status and the different views. </a:t>
-            </a:r>
-          </a:p>
-          <a:p>
-            <a:r>
-              <a:rPr lang="en-US" dirty="0" smtClean="0"/>
-              <a:t>The controller which is </a:t>
-            </a:r>
-            <a:r>
-              <a:rPr lang="en-US" dirty="0" err="1" smtClean="0"/>
-              <a:t>encharge</a:t>
-            </a:r>
-            <a:r>
-              <a:rPr lang="en-US" dirty="0" smtClean="0"/>
-              <a:t> of processing the events of the players and the proper actions. </a:t>
-            </a:r>
-          </a:p>
-          <a:p>
-            <a:r>
-              <a:rPr lang="en-US" dirty="0" smtClean="0"/>
-              <a:t>And the last one the views that are showing the contents of the model. </a:t>
-            </a:r>
-            <a:endParaRPr lang="es-ES" dirty="0"/>
+              <a:rPr lang="en-GB" noProof="0" dirty="0" smtClean="0"/>
+              <a:t>Explain: This</a:t>
+            </a:r>
+            <a:r>
+              <a:rPr lang="en-GB" baseline="0" noProof="0" dirty="0" smtClean="0"/>
+              <a:t> second deliverable its a desktop application to play Trivial. The principal restrictions are that the users have to be registered to play and the admin has access to all the statistics of the games and users. </a:t>
+            </a:r>
+            <a:endParaRPr lang="en-GB" noProof="0" dirty="0"/>
           </a:p>
         </p:txBody>
       </p:sp>
@@ -1642,7 +1787,7 @@
           <a:p>
             <a:fld id="{3EBA5BD7-F043-4D1B-AA17-CD412FC534DE}" type="slidenum">
               <a:rPr lang="es-ES" smtClean="0"/>
-              <a:t>12</a:t>
+              <a:t>11</a:t>
             </a:fld>
             <a:endParaRPr lang="es-ES"/>
           </a:p>
@@ -1651,7 +1796,7 @@
     </p:spTree>
     <p:extLst>
       <p:ext uri="{BB962C8B-B14F-4D97-AF65-F5344CB8AC3E}">
-        <p14:creationId xmlns:p14="http://schemas.microsoft.com/office/powerpoint/2010/main" val="332245227"/>
+        <p14:creationId xmlns:p14="http://schemas.microsoft.com/office/powerpoint/2010/main" val="3184010729"/>
       </p:ext>
     </p:extLst>
   </p:cSld>
@@ -1706,6 +1851,120 @@
           <a:lstStyle/>
           <a:p>
             <a:r>
+              <a:rPr lang="en-US" dirty="0" smtClean="0"/>
+              <a:t>In this deliverable we fulfil the approach of a MVC. There are three main different parts. </a:t>
+            </a:r>
+          </a:p>
+          <a:p>
+            <a:r>
+              <a:rPr lang="en-US" dirty="0" smtClean="0"/>
+              <a:t>The model that contains the business logic and the records the status. It's independent from the status and the different views. </a:t>
+            </a:r>
+          </a:p>
+          <a:p>
+            <a:r>
+              <a:rPr lang="en-US" dirty="0" smtClean="0"/>
+              <a:t>The controller which is </a:t>
+            </a:r>
+            <a:r>
+              <a:rPr lang="en-US" dirty="0" err="1" smtClean="0"/>
+              <a:t>encharge</a:t>
+            </a:r>
+            <a:r>
+              <a:rPr lang="en-US" dirty="0" smtClean="0"/>
+              <a:t> of processing the events of the players and the proper actions. </a:t>
+            </a:r>
+          </a:p>
+          <a:p>
+            <a:r>
+              <a:rPr lang="en-US" dirty="0" smtClean="0"/>
+              <a:t>And the last one the views that are showing the contents of the model. </a:t>
+            </a:r>
+            <a:endParaRPr lang="es-ES" dirty="0"/>
+          </a:p>
+        </p:txBody>
+      </p:sp>
+      <p:sp>
+        <p:nvSpPr>
+          <p:cNvPr id="4" name="Marcador de número de diapositiva 3"/>
+          <p:cNvSpPr>
+            <a:spLocks noGrp="1"/>
+          </p:cNvSpPr>
+          <p:nvPr>
+            <p:ph type="sldNum" sz="quarter" idx="10"/>
+          </p:nvPr>
+        </p:nvSpPr>
+        <p:spPr/>
+        <p:txBody>
+          <a:bodyPr/>
+          <a:lstStyle/>
+          <a:p>
+            <a:fld id="{3EBA5BD7-F043-4D1B-AA17-CD412FC534DE}" type="slidenum">
+              <a:rPr lang="es-ES" smtClean="0"/>
+              <a:t>12</a:t>
+            </a:fld>
+            <a:endParaRPr lang="es-ES"/>
+          </a:p>
+        </p:txBody>
+      </p:sp>
+    </p:spTree>
+    <p:extLst>
+      <p:ext uri="{BB962C8B-B14F-4D97-AF65-F5344CB8AC3E}">
+        <p14:creationId xmlns:p14="http://schemas.microsoft.com/office/powerpoint/2010/main" val="332245227"/>
+      </p:ext>
+    </p:extLst>
+  </p:cSld>
+  <p:clrMapOvr>
+    <a:masterClrMapping/>
+  </p:clrMapOvr>
+</p:notes>
+</file>
+
+<file path=ppt/notesSlides/notesSlide7.xml><?xml version="1.0" encoding="utf-8"?>
+<p:notes xmlns:a="http://schemas.openxmlformats.org/drawingml/2006/main" xmlns:r="http://schemas.openxmlformats.org/officeDocument/2006/relationships" xmlns:p="http://schemas.openxmlformats.org/presentationml/2006/main">
+  <p:cSld>
+    <p:spTree>
+      <p:nvGrpSpPr>
+        <p:cNvPr id="1" name=""/>
+        <p:cNvGrpSpPr/>
+        <p:nvPr/>
+      </p:nvGrpSpPr>
+      <p:grpSpPr>
+        <a:xfrm>
+          <a:off x="0" y="0"/>
+          <a:ext cx="0" cy="0"/>
+          <a:chOff x="0" y="0"/>
+          <a:chExt cx="0" cy="0"/>
+        </a:xfrm>
+      </p:grpSpPr>
+      <p:sp>
+        <p:nvSpPr>
+          <p:cNvPr id="2" name="Marcador de imagen de diapositiva 1"/>
+          <p:cNvSpPr>
+            <a:spLocks noGrp="1" noRot="1" noChangeAspect="1"/>
+          </p:cNvSpPr>
+          <p:nvPr>
+            <p:ph type="sldImg"/>
+          </p:nvPr>
+        </p:nvSpPr>
+        <p:spPr/>
+      </p:sp>
+      <p:sp>
+        <p:nvSpPr>
+          <p:cNvPr id="3" name="Marcador de notas 2"/>
+          <p:cNvSpPr>
+            <a:spLocks noGrp="1"/>
+          </p:cNvSpPr>
+          <p:nvPr>
+            <p:ph type="body" idx="1"/>
+          </p:nvPr>
+        </p:nvSpPr>
+        <p:spPr/>
+        <p:txBody>
+          <a:bodyPr/>
+          <a:lstStyle/>
+          <a:p>
+            <a:r>
               <a:rPr lang="es-ES" dirty="0" smtClean="0"/>
               <a:t>In </a:t>
             </a:r>
@@ -1827,7 +2086,19 @@
             </a:r>
             <a:r>
               <a:rPr lang="es-ES" baseline="0" dirty="0" smtClean="0"/>
-              <a:t> to Mondo DB, </a:t>
+              <a:t> </a:t>
+            </a:r>
+            <a:r>
+              <a:rPr lang="es-ES" baseline="0" smtClean="0"/>
+              <a:t>to </a:t>
+            </a:r>
+            <a:r>
+              <a:rPr lang="es-ES" baseline="0" smtClean="0"/>
+              <a:t>Mongo </a:t>
+            </a:r>
+            <a:r>
+              <a:rPr lang="es-ES" baseline="0" dirty="0" smtClean="0"/>
+              <a:t>DB, </a:t>
             </a:r>
             <a:r>
               <a:rPr lang="es-ES" baseline="0" dirty="0" err="1" smtClean="0"/>
@@ -2045,7 +2316,275 @@
 </p:notes>
 </file>
 
-<file path=ppt/notesSlides/notesSlide7.xml><?xml version="1.0" encoding="utf-8"?>
+<file path=ppt/notesSlides/notesSlide8.xml><?xml version="1.0" encoding="utf-8"?>
+<p:notes xmlns:a="http://schemas.openxmlformats.org/drawingml/2006/main" xmlns:r="http://schemas.openxmlformats.org/officeDocument/2006/relationships" xmlns:p="http://schemas.openxmlformats.org/presentationml/2006/main">
+  <p:cSld>
+    <p:spTree>
+      <p:nvGrpSpPr>
+        <p:cNvPr id="1" name=""/>
+        <p:cNvGrpSpPr/>
+        <p:nvPr/>
+      </p:nvGrpSpPr>
+      <p:grpSpPr>
+        <a:xfrm>
+          <a:off x="0" y="0"/>
+          <a:ext cx="0" cy="0"/>
+          <a:chOff x="0" y="0"/>
+          <a:chExt cx="0" cy="0"/>
+        </a:xfrm>
+      </p:grpSpPr>
+      <p:sp>
+        <p:nvSpPr>
+          <p:cNvPr id="2" name="1 Marcador de imagen de diapositiva"/>
+          <p:cNvSpPr>
+            <a:spLocks noGrp="1" noRot="1" noChangeAspect="1"/>
+          </p:cNvSpPr>
+          <p:nvPr>
+            <p:ph type="sldImg"/>
+          </p:nvPr>
+        </p:nvSpPr>
+        <p:spPr/>
+      </p:sp>
+      <p:sp>
+        <p:nvSpPr>
+          <p:cNvPr id="3" name="2 Marcador de notas"/>
+          <p:cNvSpPr>
+            <a:spLocks noGrp="1"/>
+          </p:cNvSpPr>
+          <p:nvPr>
+            <p:ph type="body" idx="1"/>
+          </p:nvPr>
+        </p:nvSpPr>
+        <p:spPr/>
+        <p:txBody>
+          <a:bodyPr/>
+          <a:lstStyle/>
+          <a:p>
+            <a:r>
+              <a:rPr lang="es-ES" dirty="0" err="1" smtClean="0"/>
+              <a:t>The</a:t>
+            </a:r>
+            <a:r>
+              <a:rPr lang="es-ES" baseline="0" dirty="0" smtClean="0"/>
+              <a:t> </a:t>
+            </a:r>
+            <a:r>
+              <a:rPr lang="es-ES" baseline="0" dirty="0" err="1" smtClean="0"/>
+              <a:t>application’s</a:t>
+            </a:r>
+            <a:r>
+              <a:rPr lang="es-ES" baseline="0" dirty="0" smtClean="0"/>
+              <a:t> interface </a:t>
+            </a:r>
+            <a:r>
+              <a:rPr lang="es-ES" baseline="0" dirty="0" err="1" smtClean="0"/>
+              <a:t>is</a:t>
+            </a:r>
+            <a:r>
+              <a:rPr lang="es-ES" baseline="0" dirty="0" smtClean="0"/>
+              <a:t> similar to </a:t>
+            </a:r>
+            <a:r>
+              <a:rPr lang="es-ES" baseline="0" dirty="0" err="1" smtClean="0"/>
+              <a:t>the</a:t>
+            </a:r>
+            <a:r>
+              <a:rPr lang="es-ES" baseline="0" dirty="0" smtClean="0"/>
+              <a:t> </a:t>
+            </a:r>
+            <a:r>
+              <a:rPr lang="es-ES" baseline="0" dirty="0" err="1" smtClean="0"/>
+              <a:t>classic</a:t>
+            </a:r>
+            <a:r>
+              <a:rPr lang="es-ES" baseline="0" dirty="0" smtClean="0"/>
+              <a:t> </a:t>
+            </a:r>
+            <a:r>
+              <a:rPr lang="es-ES" baseline="0" dirty="0" err="1" smtClean="0"/>
+              <a:t>game</a:t>
+            </a:r>
+            <a:r>
+              <a:rPr lang="es-ES" baseline="0" dirty="0" smtClean="0"/>
+              <a:t>, </a:t>
+            </a:r>
+            <a:r>
+              <a:rPr lang="es-ES" baseline="0" dirty="0" err="1" smtClean="0"/>
+              <a:t>making</a:t>
+            </a:r>
+            <a:r>
+              <a:rPr lang="es-ES" baseline="0" dirty="0" smtClean="0"/>
+              <a:t> </a:t>
+            </a:r>
+            <a:r>
+              <a:rPr lang="es-ES" baseline="0" dirty="0" err="1" smtClean="0"/>
+              <a:t>it</a:t>
+            </a:r>
+            <a:r>
+              <a:rPr lang="es-ES" baseline="0" dirty="0" smtClean="0"/>
+              <a:t> </a:t>
+            </a:r>
+            <a:r>
+              <a:rPr lang="es-ES" baseline="0" dirty="0" err="1" smtClean="0"/>
+              <a:t>easy</a:t>
+            </a:r>
+            <a:r>
+              <a:rPr lang="es-ES" baseline="0" dirty="0" smtClean="0"/>
+              <a:t> to </a:t>
+            </a:r>
+            <a:r>
+              <a:rPr lang="es-ES" baseline="0" dirty="0" err="1" smtClean="0"/>
+              <a:t>adapt</a:t>
+            </a:r>
+            <a:r>
+              <a:rPr lang="es-ES" baseline="0" dirty="0" smtClean="0"/>
+              <a:t> to. </a:t>
+            </a:r>
+            <a:r>
+              <a:rPr lang="es-ES" baseline="0" dirty="0" err="1" smtClean="0"/>
+              <a:t>The</a:t>
+            </a:r>
+            <a:r>
+              <a:rPr lang="es-ES" baseline="0" dirty="0" smtClean="0"/>
+              <a:t> </a:t>
+            </a:r>
+            <a:r>
+              <a:rPr lang="es-ES" baseline="0" dirty="0" err="1" smtClean="0"/>
+              <a:t>user</a:t>
+            </a:r>
+            <a:r>
+              <a:rPr lang="es-ES" baseline="0" dirty="0" smtClean="0"/>
+              <a:t> can </a:t>
+            </a:r>
+            <a:r>
+              <a:rPr lang="es-ES" baseline="0" dirty="0" err="1" smtClean="0"/>
+              <a:t>change</a:t>
+            </a:r>
+            <a:r>
+              <a:rPr lang="es-ES" baseline="0" dirty="0" smtClean="0"/>
+              <a:t> </a:t>
+            </a:r>
+            <a:r>
+              <a:rPr lang="es-ES" baseline="0" dirty="0" err="1" smtClean="0"/>
+              <a:t>the</a:t>
+            </a:r>
+            <a:r>
+              <a:rPr lang="es-ES" baseline="0" dirty="0" smtClean="0"/>
+              <a:t> look of </a:t>
+            </a:r>
+            <a:r>
+              <a:rPr lang="es-ES" baseline="0" dirty="0" err="1" smtClean="0"/>
+              <a:t>the</a:t>
+            </a:r>
+            <a:r>
+              <a:rPr lang="es-ES" baseline="0" dirty="0" smtClean="0"/>
+              <a:t> </a:t>
+            </a:r>
+            <a:r>
+              <a:rPr lang="es-ES" baseline="0" dirty="0" err="1" smtClean="0"/>
+              <a:t>application</a:t>
+            </a:r>
+            <a:r>
+              <a:rPr lang="es-ES" baseline="0" dirty="0" smtClean="0"/>
+              <a:t> </a:t>
+            </a:r>
+            <a:r>
+              <a:rPr lang="es-ES" baseline="0" dirty="0" err="1" smtClean="0"/>
+              <a:t>while</a:t>
+            </a:r>
+            <a:r>
+              <a:rPr lang="es-ES" baseline="0" dirty="0" smtClean="0"/>
+              <a:t> </a:t>
+            </a:r>
+            <a:r>
+              <a:rPr lang="es-ES" baseline="0" dirty="0" err="1" smtClean="0"/>
+              <a:t>it’s</a:t>
+            </a:r>
+            <a:r>
+              <a:rPr lang="es-ES" baseline="0" dirty="0" smtClean="0"/>
+              <a:t> </a:t>
+            </a:r>
+            <a:r>
+              <a:rPr lang="es-ES" baseline="0" dirty="0" err="1" smtClean="0"/>
+              <a:t>running</a:t>
+            </a:r>
+            <a:r>
+              <a:rPr lang="es-ES" baseline="0" dirty="0" smtClean="0"/>
+              <a:t>, </a:t>
+            </a:r>
+            <a:r>
+              <a:rPr lang="es-ES" baseline="0" dirty="0" err="1" smtClean="0"/>
+              <a:t>for</a:t>
+            </a:r>
+            <a:r>
+              <a:rPr lang="es-ES" baseline="0" dirty="0" smtClean="0"/>
+              <a:t> </a:t>
+            </a:r>
+            <a:r>
+              <a:rPr lang="es-ES" baseline="0" dirty="0" err="1" smtClean="0"/>
+              <a:t>now</a:t>
+            </a:r>
+            <a:r>
+              <a:rPr lang="es-ES" baseline="0" dirty="0" smtClean="0"/>
+              <a:t> </a:t>
+            </a:r>
+            <a:r>
+              <a:rPr lang="es-ES" baseline="0" dirty="0" err="1" smtClean="0"/>
+              <a:t>colors</a:t>
+            </a:r>
+            <a:r>
+              <a:rPr lang="es-ES" baseline="0" dirty="0" smtClean="0"/>
+              <a:t> can be </a:t>
+            </a:r>
+            <a:r>
+              <a:rPr lang="es-ES" baseline="0" dirty="0" err="1" smtClean="0"/>
+              <a:t>changed</a:t>
+            </a:r>
+            <a:r>
+              <a:rPr lang="es-ES" baseline="0" dirty="0" smtClean="0"/>
+              <a:t>.</a:t>
+            </a:r>
+            <a:endParaRPr lang="es-ES" dirty="0"/>
+          </a:p>
+        </p:txBody>
+      </p:sp>
+      <p:sp>
+        <p:nvSpPr>
+          <p:cNvPr id="4" name="3 Marcador de número de diapositiva"/>
+          <p:cNvSpPr>
+            <a:spLocks noGrp="1"/>
+          </p:cNvSpPr>
+          <p:nvPr>
+            <p:ph type="sldNum" sz="quarter" idx="10"/>
+          </p:nvPr>
+        </p:nvSpPr>
+        <p:spPr/>
+        <p:txBody>
+          <a:bodyPr/>
+          <a:lstStyle/>
+          <a:p>
+            <a:fld id="{3EBA5BD7-F043-4D1B-AA17-CD412FC534DE}" type="slidenum">
+              <a:rPr lang="es-ES" smtClean="0"/>
+              <a:t>14</a:t>
+            </a:fld>
+            <a:endParaRPr lang="es-ES"/>
+          </a:p>
+        </p:txBody>
+      </p:sp>
+    </p:spTree>
+    <p:extLst>
+      <p:ext uri="{BB962C8B-B14F-4D97-AF65-F5344CB8AC3E}">
+        <p14:creationId xmlns:p14="http://schemas.microsoft.com/office/powerpoint/2010/main" val="133803600"/>
+      </p:ext>
+    </p:extLst>
+  </p:cSld>
+  <p:clrMapOvr>
+    <a:masterClrMapping/>
+  </p:clrMapOvr>
+</p:notes>
+</file>
+
+<file path=ppt/notesSlides/notesSlide9.xml><?xml version="1.0" encoding="utf-8"?>
 <p:notes xmlns:a="http://schemas.openxmlformats.org/drawingml/2006/main" xmlns:r="http://schemas.openxmlformats.org/officeDocument/2006/relationships" xmlns:p="http://schemas.openxmlformats.org/presentationml/2006/main">
   <p:cSld>
     <p:spTree>
@@ -2315,7 +2854,7 @@
           <a:p>
             <a:fld id="{F0DFD029-FB74-4578-B929-F66AA97659CA}" type="datetimeFigureOut">
               <a:rPr lang="es-ES" smtClean="0"/>
-              <a:t>09/05/2015</a:t>
+              <a:t>10/05/2015</a:t>
             </a:fld>
             <a:endParaRPr lang="es-ES"/>
           </a:p>
@@ -2610,7 +3149,7 @@
             <a:fld id="{F0DFD029-FB74-4578-B929-F66AA97659CA}" type="datetimeFigureOut">
               <a:rPr lang="es-ES" smtClean="0"/>
               <a:pPr/>
-              <a:t>09/05/2015</a:t>
+              <a:t>10/05/2015</a:t>
             </a:fld>
             <a:endParaRPr lang="es-ES"/>
           </a:p>
@@ -2813,7 +3352,7 @@
             <a:fld id="{F0DFD029-FB74-4578-B929-F66AA97659CA}" type="datetimeFigureOut">
               <a:rPr lang="es-ES" smtClean="0"/>
               <a:pPr/>
-              <a:t>09/05/2015</a:t>
+              <a:t>10/05/2015</a:t>
             </a:fld>
             <a:endParaRPr lang="es-ES"/>
           </a:p>
@@ -3095,7 +3634,7 @@
             <a:fld id="{F0DFD029-FB74-4578-B929-F66AA97659CA}" type="datetimeFigureOut">
               <a:rPr lang="es-ES" smtClean="0"/>
               <a:pPr/>
-              <a:t>09/05/2015</a:t>
+              <a:t>10/05/2015</a:t>
             </a:fld>
             <a:endParaRPr lang="es-ES"/>
           </a:p>
@@ -3445,7 +3984,7 @@
             <a:fld id="{F0DFD029-FB74-4578-B929-F66AA97659CA}" type="datetimeFigureOut">
               <a:rPr lang="es-ES" smtClean="0"/>
               <a:pPr/>
-              <a:t>09/05/2015</a:t>
+              <a:t>10/05/2015</a:t>
             </a:fld>
             <a:endParaRPr lang="es-ES"/>
           </a:p>
@@ -4077,7 +4616,7 @@
             <a:fld id="{F0DFD029-FB74-4578-B929-F66AA97659CA}" type="datetimeFigureOut">
               <a:rPr lang="es-ES" smtClean="0"/>
               <a:pPr/>
-              <a:t>09/05/2015</a:t>
+              <a:t>10/05/2015</a:t>
             </a:fld>
             <a:endParaRPr lang="es-ES"/>
           </a:p>
@@ -4946,7 +5485,7 @@
             <a:fld id="{F0DFD029-FB74-4578-B929-F66AA97659CA}" type="datetimeFigureOut">
               <a:rPr lang="es-ES" smtClean="0"/>
               <a:pPr/>
-              <a:t>09/05/2015</a:t>
+              <a:t>10/05/2015</a:t>
             </a:fld>
             <a:endParaRPr lang="es-ES"/>
           </a:p>
@@ -5124,7 +5663,7 @@
           <a:p>
             <a:fld id="{F0DFD029-FB74-4578-B929-F66AA97659CA}" type="datetimeFigureOut">
               <a:rPr lang="es-ES" smtClean="0"/>
-              <a:t>09/05/2015</a:t>
+              <a:t>10/05/2015</a:t>
             </a:fld>
             <a:endParaRPr lang="es-ES"/>
           </a:p>
@@ -5323,7 +5862,7 @@
           <a:p>
             <a:fld id="{F0DFD029-FB74-4578-B929-F66AA97659CA}" type="datetimeFigureOut">
               <a:rPr lang="es-ES" smtClean="0"/>
-              <a:t>09/05/2015</a:t>
+              <a:t>10/05/2015</a:t>
             </a:fld>
             <a:endParaRPr lang="es-ES"/>
           </a:p>
@@ -5512,7 +6051,7 @@
           <a:p>
             <a:fld id="{F0DFD029-FB74-4578-B929-F66AA97659CA}" type="datetimeFigureOut">
               <a:rPr lang="es-ES" smtClean="0"/>
-              <a:t>09/05/2015</a:t>
+              <a:t>10/05/2015</a:t>
             </a:fld>
             <a:endParaRPr lang="es-ES"/>
           </a:p>
@@ -5778,7 +6317,7 @@
           <a:p>
             <a:fld id="{F0DFD029-FB74-4578-B929-F66AA97659CA}" type="datetimeFigureOut">
               <a:rPr lang="es-ES" smtClean="0"/>
-              <a:t>09/05/2015</a:t>
+              <a:t>10/05/2015</a:t>
             </a:fld>
             <a:endParaRPr lang="es-ES"/>
           </a:p>
@@ -6089,7 +6628,7 @@
           <a:p>
             <a:fld id="{F0DFD029-FB74-4578-B929-F66AA97659CA}" type="datetimeFigureOut">
               <a:rPr lang="es-ES" smtClean="0"/>
-              <a:t>09/05/2015</a:t>
+              <a:t>10/05/2015</a:t>
             </a:fld>
             <a:endParaRPr lang="es-ES"/>
           </a:p>
@@ -6552,7 +7091,7 @@
           <a:p>
             <a:fld id="{F0DFD029-FB74-4578-B929-F66AA97659CA}" type="datetimeFigureOut">
               <a:rPr lang="es-ES" smtClean="0"/>
-              <a:t>09/05/2015</a:t>
+              <a:t>10/05/2015</a:t>
             </a:fld>
             <a:endParaRPr lang="es-ES"/>
           </a:p>
@@ -6689,7 +7228,7 @@
           <a:p>
             <a:fld id="{F0DFD029-FB74-4578-B929-F66AA97659CA}" type="datetimeFigureOut">
               <a:rPr lang="es-ES" smtClean="0"/>
-              <a:t>09/05/2015</a:t>
+              <a:t>10/05/2015</a:t>
             </a:fld>
             <a:endParaRPr lang="es-ES"/>
           </a:p>
@@ -6803,7 +7342,7 @@
           <a:p>
             <a:fld id="{F0DFD029-FB74-4578-B929-F66AA97659CA}" type="datetimeFigureOut">
               <a:rPr lang="es-ES" smtClean="0"/>
-              <a:t>09/05/2015</a:t>
+              <a:t>10/05/2015</a:t>
             </a:fld>
             <a:endParaRPr lang="es-ES"/>
           </a:p>
@@ -7101,7 +7640,7 @@
           <a:p>
             <a:fld id="{F0DFD029-FB74-4578-B929-F66AA97659CA}" type="datetimeFigureOut">
               <a:rPr lang="es-ES" smtClean="0"/>
-              <a:t>09/05/2015</a:t>
+              <a:t>10/05/2015</a:t>
             </a:fld>
             <a:endParaRPr lang="es-ES"/>
           </a:p>
@@ -7395,7 +7934,7 @@
           <a:p>
             <a:fld id="{F0DFD029-FB74-4578-B929-F66AA97659CA}" type="datetimeFigureOut">
               <a:rPr lang="es-ES" smtClean="0"/>
-              <a:t>09/05/2015</a:t>
+              <a:t>10/05/2015</a:t>
             </a:fld>
             <a:endParaRPr lang="es-ES"/>
           </a:p>
@@ -7844,7 +8383,7 @@
             <a:fld id="{F0DFD029-FB74-4578-B929-F66AA97659CA}" type="datetimeFigureOut">
               <a:rPr lang="es-ES" smtClean="0"/>
               <a:pPr/>
-              <a:t>09/05/2015</a:t>
+              <a:t>10/05/2015</a:t>
             </a:fld>
             <a:endParaRPr lang="es-ES"/>
           </a:p>
@@ -8816,7 +9355,6 @@
               <a:rPr lang="en-US" sz="3600" dirty="0" smtClean="0"/>
               <a:t>Desktop Application </a:t>
             </a:r>
-            <a:endParaRPr lang="en-US" sz="3600" dirty="0" smtClean="0"/>
           </a:p>
           <a:p>
             <a:pPr>
@@ -9366,13 +9904,13 @@
   <p:clrMapOvr>
     <a:masterClrMapping/>
   </p:clrMapOvr>
-  <mc:AlternateContent xmlns:mc="http://schemas.openxmlformats.org/markup-compatibility/2006">
-    <mc:Choice xmlns:p14="http://schemas.microsoft.com/office/powerpoint/2010/main" Requires="p14">
+  <mc:AlternateContent xmlns:mc="http://schemas.openxmlformats.org/markup-compatibility/2006" xmlns:p14="http://schemas.microsoft.com/office/powerpoint/2010/main">
+    <mc:Choice Requires="p14">
       <p:transition spd="med" p14:dur="700">
         <p:fade/>
       </p:transition>
     </mc:Choice>
-    <mc:Fallback>
+    <mc:Fallback xmlns="">
       <p:transition spd="med">
         <p:fade/>
       </p:transition>
@@ -9466,11 +10004,24 @@
             <p:ph sz="half" idx="2"/>
           </p:nvPr>
         </p:nvSpPr>
-        <p:spPr/>
+        <p:spPr>
+          <a:xfrm>
+            <a:off x="1103025" y="2514600"/>
+            <a:ext cx="4395194" cy="698376"/>
+          </a:xfrm>
+        </p:spPr>
         <p:txBody>
           <a:bodyPr/>
           <a:lstStyle/>
           <a:p>
+            <a:r>
+              <a:rPr lang="es-ES" dirty="0" err="1" smtClean="0"/>
+              <a:t>User-friendly</a:t>
+            </a:r>
+            <a:r>
+              <a:rPr lang="es-ES" dirty="0" smtClean="0"/>
+              <a:t> interface</a:t>
+            </a:r>
             <a:endParaRPr lang="es-ES" dirty="0"/>
           </a:p>
         </p:txBody>
@@ -9504,12 +10055,65 @@
             <p:ph sz="quarter" idx="4"/>
           </p:nvPr>
         </p:nvSpPr>
-        <p:spPr/>
+        <p:spPr>
+          <a:xfrm>
+            <a:off x="1125860" y="3140968"/>
+            <a:ext cx="4395194" cy="1058416"/>
+          </a:xfrm>
+        </p:spPr>
         <p:txBody>
           <a:bodyPr/>
           <a:lstStyle/>
           <a:p>
-            <a:endParaRPr lang="es-ES"/>
+            <a:r>
+              <a:rPr lang="es-ES" dirty="0" smtClean="0"/>
+              <a:t>Look &amp; </a:t>
+            </a:r>
+            <a:r>
+              <a:rPr lang="es-ES" dirty="0" err="1" smtClean="0"/>
+              <a:t>feel</a:t>
+            </a:r>
+            <a:r>
+              <a:rPr lang="es-ES" dirty="0" smtClean="0"/>
+              <a:t> of </a:t>
+            </a:r>
+            <a:r>
+              <a:rPr lang="es-ES" dirty="0" err="1" smtClean="0"/>
+              <a:t>the</a:t>
+            </a:r>
+            <a:r>
+              <a:rPr lang="es-ES" dirty="0" smtClean="0"/>
+              <a:t> </a:t>
+            </a:r>
+            <a:r>
+              <a:rPr lang="es-ES" dirty="0" err="1" smtClean="0"/>
+              <a:t>application</a:t>
+            </a:r>
+            <a:r>
+              <a:rPr lang="es-ES" dirty="0" smtClean="0"/>
+              <a:t> can be </a:t>
+            </a:r>
+            <a:r>
+              <a:rPr lang="es-ES" dirty="0" err="1" smtClean="0"/>
+              <a:t>changed</a:t>
+            </a:r>
+            <a:r>
+              <a:rPr lang="es-ES" dirty="0" smtClean="0"/>
+              <a:t> </a:t>
+            </a:r>
+            <a:r>
+              <a:rPr lang="es-ES" dirty="0" err="1" smtClean="0"/>
+              <a:t>during</a:t>
+            </a:r>
+            <a:r>
+              <a:rPr lang="es-ES" dirty="0" smtClean="0"/>
+              <a:t> </a:t>
+            </a:r>
+            <a:r>
+              <a:rPr lang="es-ES" dirty="0" err="1" smtClean="0"/>
+              <a:t>execution</a:t>
+            </a:r>
+            <a:endParaRPr lang="es-ES" dirty="0"/>
           </a:p>
         </p:txBody>
       </p:sp>
@@ -9618,15 +10222,7 @@
             </a:r>
             <a:r>
               <a:rPr lang="en-GB" sz="2400" dirty="0" smtClean="0"/>
-              <a:t>(Java, Continuous integration, Version</a:t>
-            </a:r>
-            <a:r>
-              <a:rPr lang="en-GB" sz="2400" dirty="0" smtClean="0"/>
-              <a:t> Control Flow, </a:t>
-            </a:r>
-            <a:r>
-              <a:rPr lang="en-GB" sz="2400" dirty="0" smtClean="0"/>
-              <a:t>Persistence) </a:t>
+              <a:t>(Java, Continuous integration, Version Control Flow, Persistence) </a:t>
             </a:r>
           </a:p>
           <a:p>
@@ -10022,13 +10618,13 @@
   <p:clrMapOvr>
     <a:masterClrMapping/>
   </p:clrMapOvr>
-  <mc:AlternateContent xmlns:mc="http://schemas.openxmlformats.org/markup-compatibility/2006">
-    <mc:Choice xmlns:p14="http://schemas.microsoft.com/office/powerpoint/2010/main" Requires="p14">
+  <mc:AlternateContent xmlns:mc="http://schemas.openxmlformats.org/markup-compatibility/2006" xmlns:p14="http://schemas.microsoft.com/office/powerpoint/2010/main">
+    <mc:Choice Requires="p14">
       <p:transition spd="med" p14:dur="700">
         <p:fade/>
       </p:transition>
     </mc:Choice>
-    <mc:Fallback>
+    <mc:Fallback xmlns="">
       <p:transition spd="med">
         <p:fade/>
       </p:transition>
@@ -10429,13 +11025,13 @@
   <p:clrMapOvr>
     <a:masterClrMapping/>
   </p:clrMapOvr>
-  <mc:AlternateContent xmlns:mc="http://schemas.openxmlformats.org/markup-compatibility/2006">
-    <mc:Choice xmlns:p14="http://schemas.microsoft.com/office/powerpoint/2010/main" Requires="p14">
+  <mc:AlternateContent xmlns:mc="http://schemas.openxmlformats.org/markup-compatibility/2006" xmlns:p14="http://schemas.microsoft.com/office/powerpoint/2010/main">
+    <mc:Choice Requires="p14">
       <p:transition spd="med" p14:dur="700">
         <p:fade/>
       </p:transition>
     </mc:Choice>
-    <mc:Fallback>
+    <mc:Fallback xmlns="">
       <p:transition spd="med">
         <p:fade/>
       </p:transition>
@@ -11525,13 +12121,13 @@
   <p:clrMapOvr>
     <a:masterClrMapping/>
   </p:clrMapOvr>
-  <mc:AlternateContent xmlns:mc="http://schemas.openxmlformats.org/markup-compatibility/2006">
-    <mc:Choice xmlns:p14="http://schemas.microsoft.com/office/powerpoint/2010/main" Requires="p14">
+  <mc:AlternateContent xmlns:mc="http://schemas.openxmlformats.org/markup-compatibility/2006" xmlns:p14="http://schemas.microsoft.com/office/powerpoint/2010/main">
+    <mc:Choice Requires="p14">
       <p:transition spd="med" p14:dur="700">
         <p:fade/>
       </p:transition>
     </mc:Choice>
-    <mc:Fallback>
+    <mc:Fallback xmlns="">
       <p:transition spd="med">
         <p:fade/>
       </p:transition>
@@ -11625,11 +12221,56 @@
             <p:ph sz="half" idx="2"/>
           </p:nvPr>
         </p:nvSpPr>
-        <p:spPr/>
+        <p:spPr>
+          <a:xfrm>
+            <a:off x="1125860" y="2492896"/>
+            <a:ext cx="4395194" cy="864096"/>
+          </a:xfrm>
+        </p:spPr>
         <p:txBody>
           <a:bodyPr/>
           <a:lstStyle/>
           <a:p>
+            <a:r>
+              <a:rPr lang="es-ES" dirty="0" err="1" smtClean="0"/>
+              <a:t>Multiple</a:t>
+            </a:r>
+            <a:r>
+              <a:rPr lang="es-ES" dirty="0" smtClean="0"/>
+              <a:t> input </a:t>
+            </a:r>
+            <a:r>
+              <a:rPr lang="es-ES" dirty="0" err="1" smtClean="0"/>
+              <a:t>options</a:t>
+            </a:r>
+            <a:r>
+              <a:rPr lang="es-ES" dirty="0" smtClean="0"/>
+              <a:t> </a:t>
+            </a:r>
+            <a:r>
+              <a:rPr lang="es-ES" dirty="0" err="1" smtClean="0"/>
+              <a:t>for</a:t>
+            </a:r>
+            <a:r>
+              <a:rPr lang="es-ES" dirty="0" smtClean="0"/>
+              <a:t> </a:t>
+            </a:r>
+            <a:r>
+              <a:rPr lang="es-ES" dirty="0" err="1" smtClean="0"/>
+              <a:t>faster</a:t>
+            </a:r>
+            <a:r>
+              <a:rPr lang="es-ES" dirty="0" smtClean="0"/>
+              <a:t> </a:t>
+            </a:r>
+            <a:r>
+              <a:rPr lang="es-ES" dirty="0" err="1" smtClean="0"/>
+              <a:t>usage</a:t>
+            </a:r>
+            <a:r>
+              <a:rPr lang="es-ES" dirty="0"/>
+              <a:t>.</a:t>
+            </a:r>
             <a:endParaRPr lang="es-ES" dirty="0"/>
           </a:p>
         </p:txBody>
@@ -11663,12 +12304,322 @@
             <p:ph sz="quarter" idx="4"/>
           </p:nvPr>
         </p:nvSpPr>
-        <p:spPr/>
+        <p:spPr>
+          <a:xfrm>
+            <a:off x="1125860" y="3356992"/>
+            <a:ext cx="4395194" cy="3741738"/>
+          </a:xfrm>
+        </p:spPr>
         <p:txBody>
           <a:bodyPr/>
           <a:lstStyle/>
           <a:p>
-            <a:endParaRPr lang="es-ES"/>
+            <a:r>
+              <a:rPr lang="es-ES" dirty="0" smtClean="0"/>
+              <a:t>Simple </a:t>
+            </a:r>
+            <a:r>
+              <a:rPr lang="es-ES" dirty="0" err="1" smtClean="0"/>
+              <a:t>commands</a:t>
+            </a:r>
+            <a:r>
+              <a:rPr lang="es-ES" dirty="0" smtClean="0"/>
+              <a:t> </a:t>
+            </a:r>
+            <a:r>
+              <a:rPr lang="es-ES" dirty="0" err="1" smtClean="0"/>
+              <a:t>make</a:t>
+            </a:r>
+            <a:r>
+              <a:rPr lang="es-ES" dirty="0" smtClean="0"/>
+              <a:t> </a:t>
+            </a:r>
+            <a:r>
+              <a:rPr lang="es-ES" dirty="0" err="1" smtClean="0"/>
+              <a:t>it</a:t>
+            </a:r>
+            <a:r>
+              <a:rPr lang="es-ES" dirty="0" smtClean="0"/>
+              <a:t> </a:t>
+            </a:r>
+            <a:r>
+              <a:rPr lang="es-ES" dirty="0" err="1" smtClean="0"/>
+              <a:t>easy</a:t>
+            </a:r>
+            <a:r>
+              <a:rPr lang="es-ES" dirty="0" smtClean="0"/>
+              <a:t> to </a:t>
+            </a:r>
+            <a:r>
+              <a:rPr lang="es-ES" dirty="0" err="1" smtClean="0"/>
+              <a:t>work</a:t>
+            </a:r>
+            <a:r>
+              <a:rPr lang="es-ES" dirty="0" smtClean="0"/>
+              <a:t> </a:t>
+            </a:r>
+            <a:r>
+              <a:rPr lang="es-ES" dirty="0" err="1" smtClean="0"/>
+              <a:t>with</a:t>
+            </a:r>
+            <a:r>
+              <a:rPr lang="es-ES" dirty="0" smtClean="0"/>
+              <a:t>.</a:t>
+            </a:r>
+            <a:endParaRPr lang="es-ES" dirty="0"/>
+          </a:p>
+        </p:txBody>
+      </p:sp>
+      <p:sp>
+        <p:nvSpPr>
+          <p:cNvPr id="7" name="Marcador de contenido 3"/>
+          <p:cNvSpPr txBox="1">
+            <a:spLocks/>
+          </p:cNvSpPr>
+          <p:nvPr/>
+        </p:nvSpPr>
+        <p:spPr>
+          <a:xfrm>
+            <a:off x="1125860" y="4221088"/>
+            <a:ext cx="4395194" cy="864096"/>
+          </a:xfrm>
+          <a:prstGeom prst="rect">
+            <a:avLst/>
+          </a:prstGeom>
+        </p:spPr>
+        <p:txBody>
+          <a:bodyPr vert="horz" lIns="91440" tIns="45720" rIns="91440" bIns="45720" rtlCol="0">
+            <a:normAutofit/>
+          </a:bodyPr>
+          <a:lstStyle>
+            <a:lvl1pPr marL="342797" indent="-342797" algn="l" defTabSz="457063" rtl="0" eaLnBrk="1" latinLnBrk="0" hangingPunct="1">
+              <a:spcBef>
+                <a:spcPts val="1000"/>
+              </a:spcBef>
+              <a:spcAft>
+                <a:spcPts val="0"/>
+              </a:spcAft>
+              <a:buClr>
+                <a:schemeClr val="bg2">
+                  <a:lumMod val="40000"/>
+                  <a:lumOff val="60000"/>
+                </a:schemeClr>
+              </a:buClr>
+              <a:buSzPct val="80000"/>
+              <a:buFont typeface="Wingdings 3" charset="2"/>
+              <a:buChar char=""/>
+              <a:defRPr sz="1799" b="0" i="0" kern="1200">
+                <a:solidFill>
+                  <a:schemeClr val="tx1"/>
+                </a:solidFill>
+                <a:latin typeface="+mj-lt"/>
+                <a:ea typeface="+mj-ea"/>
+                <a:cs typeface="+mj-cs"/>
+              </a:defRPr>
+            </a:lvl1pPr>
+            <a:lvl2pPr marL="742727" indent="-285664" algn="l" defTabSz="457063" rtl="0" eaLnBrk="1" latinLnBrk="0" hangingPunct="1">
+              <a:spcBef>
+                <a:spcPts val="1000"/>
+              </a:spcBef>
+              <a:spcAft>
+                <a:spcPts val="0"/>
+              </a:spcAft>
+              <a:buClr>
+                <a:schemeClr val="bg2">
+                  <a:lumMod val="40000"/>
+                  <a:lumOff val="60000"/>
+                </a:schemeClr>
+              </a:buClr>
+              <a:buSzPct val="80000"/>
+              <a:buFont typeface="Wingdings 3" charset="2"/>
+              <a:buChar char=""/>
+              <a:defRPr sz="1600" b="0" i="0" kern="1200">
+                <a:solidFill>
+                  <a:schemeClr val="tx1"/>
+                </a:solidFill>
+                <a:latin typeface="+mj-lt"/>
+                <a:ea typeface="+mj-ea"/>
+                <a:cs typeface="+mj-cs"/>
+              </a:defRPr>
+            </a:lvl2pPr>
+            <a:lvl3pPr marL="1142657" indent="-228531" algn="l" defTabSz="457063" rtl="0" eaLnBrk="1" latinLnBrk="0" hangingPunct="1">
+              <a:spcBef>
+                <a:spcPts val="1000"/>
+              </a:spcBef>
+              <a:spcAft>
+                <a:spcPts val="0"/>
+              </a:spcAft>
+              <a:buClr>
+                <a:schemeClr val="bg2">
+                  <a:lumMod val="40000"/>
+                  <a:lumOff val="60000"/>
+                </a:schemeClr>
+              </a:buClr>
+              <a:buSzPct val="80000"/>
+              <a:buFont typeface="Wingdings 3" charset="2"/>
+              <a:buChar char=""/>
+              <a:defRPr sz="1400" b="0" i="0" kern="1200">
+                <a:solidFill>
+                  <a:schemeClr val="tx1"/>
+                </a:solidFill>
+                <a:latin typeface="+mj-lt"/>
+                <a:ea typeface="+mj-ea"/>
+                <a:cs typeface="+mj-cs"/>
+              </a:defRPr>
+            </a:lvl3pPr>
+            <a:lvl4pPr marL="1599720" indent="-228531" algn="l" defTabSz="457063" rtl="0" eaLnBrk="1" latinLnBrk="0" hangingPunct="1">
+              <a:spcBef>
+                <a:spcPts val="1000"/>
+              </a:spcBef>
+              <a:spcAft>
+                <a:spcPts val="0"/>
+              </a:spcAft>
+              <a:buClr>
+                <a:schemeClr val="bg2">
+                  <a:lumMod val="40000"/>
+                  <a:lumOff val="60000"/>
+                </a:schemeClr>
+              </a:buClr>
+              <a:buSzPct val="80000"/>
+              <a:buFont typeface="Wingdings 3" charset="2"/>
+              <a:buChar char=""/>
+              <a:defRPr sz="1200" b="0" i="0" kern="1200">
+                <a:solidFill>
+                  <a:schemeClr val="tx1"/>
+                </a:solidFill>
+                <a:latin typeface="+mj-lt"/>
+                <a:ea typeface="+mj-ea"/>
+                <a:cs typeface="+mj-cs"/>
+              </a:defRPr>
+            </a:lvl4pPr>
+            <a:lvl5pPr marL="2056783" indent="-228531" algn="l" defTabSz="457063" rtl="0" eaLnBrk="1" latinLnBrk="0" hangingPunct="1">
+              <a:spcBef>
+                <a:spcPts val="1000"/>
+              </a:spcBef>
+              <a:spcAft>
+                <a:spcPts val="0"/>
+              </a:spcAft>
+              <a:buClr>
+                <a:schemeClr val="bg2">
+                  <a:lumMod val="40000"/>
+                  <a:lumOff val="60000"/>
+                </a:schemeClr>
+              </a:buClr>
+              <a:buSzPct val="80000"/>
+              <a:buFont typeface="Wingdings 3" charset="2"/>
+              <a:buChar char=""/>
+              <a:defRPr sz="1200" b="0" i="0" kern="1200">
+                <a:solidFill>
+                  <a:schemeClr val="tx1"/>
+                </a:solidFill>
+                <a:latin typeface="+mj-lt"/>
+                <a:ea typeface="+mj-ea"/>
+                <a:cs typeface="+mj-cs"/>
+              </a:defRPr>
+            </a:lvl5pPr>
+            <a:lvl6pPr marL="2505248" indent="-228531" algn="l" defTabSz="457063" rtl="0" eaLnBrk="1" latinLnBrk="0" hangingPunct="1">
+              <a:spcBef>
+                <a:spcPts val="1000"/>
+              </a:spcBef>
+              <a:spcAft>
+                <a:spcPts val="0"/>
+              </a:spcAft>
+              <a:buClr>
+                <a:schemeClr val="bg2">
+                  <a:lumMod val="40000"/>
+                  <a:lumOff val="60000"/>
+                </a:schemeClr>
+              </a:buClr>
+              <a:buSzPct val="80000"/>
+              <a:buFont typeface="Wingdings 3" charset="2"/>
+              <a:buChar char=""/>
+              <a:defRPr sz="1200" b="0" i="0" kern="1200">
+                <a:solidFill>
+                  <a:schemeClr val="tx1"/>
+                </a:solidFill>
+                <a:latin typeface="+mj-lt"/>
+                <a:ea typeface="+mj-ea"/>
+                <a:cs typeface="+mj-cs"/>
+              </a:defRPr>
+            </a:lvl6pPr>
+            <a:lvl7pPr marL="2970908" indent="-228531" algn="l" defTabSz="457063" rtl="0" eaLnBrk="1" latinLnBrk="0" hangingPunct="1">
+              <a:spcBef>
+                <a:spcPts val="1000"/>
+              </a:spcBef>
+              <a:spcAft>
+                <a:spcPts val="0"/>
+              </a:spcAft>
+              <a:buClr>
+                <a:schemeClr val="bg2">
+                  <a:lumMod val="40000"/>
+                  <a:lumOff val="60000"/>
+                </a:schemeClr>
+              </a:buClr>
+              <a:buSzPct val="80000"/>
+              <a:buFont typeface="Wingdings 3" charset="2"/>
+              <a:buChar char=""/>
+              <a:defRPr sz="1200" b="0" i="0" kern="1200">
+                <a:solidFill>
+                  <a:schemeClr val="tx1"/>
+                </a:solidFill>
+                <a:latin typeface="+mj-lt"/>
+                <a:ea typeface="+mj-ea"/>
+                <a:cs typeface="+mj-cs"/>
+              </a:defRPr>
+            </a:lvl7pPr>
+            <a:lvl8pPr marL="3427971" indent="-228531" algn="l" defTabSz="457063" rtl="0" eaLnBrk="1" latinLnBrk="0" hangingPunct="1">
+              <a:spcBef>
+                <a:spcPts val="1000"/>
+              </a:spcBef>
+              <a:spcAft>
+                <a:spcPts val="0"/>
+              </a:spcAft>
+              <a:buClr>
+                <a:schemeClr val="bg2">
+                  <a:lumMod val="40000"/>
+                  <a:lumOff val="60000"/>
+                </a:schemeClr>
+              </a:buClr>
+              <a:buSzPct val="80000"/>
+              <a:buFont typeface="Wingdings 3" charset="2"/>
+              <a:buChar char=""/>
+              <a:defRPr sz="1200" b="0" i="0" kern="1200">
+                <a:solidFill>
+                  <a:schemeClr val="tx1"/>
+                </a:solidFill>
+                <a:latin typeface="+mj-lt"/>
+                <a:ea typeface="+mj-ea"/>
+                <a:cs typeface="+mj-cs"/>
+              </a:defRPr>
+            </a:lvl8pPr>
+            <a:lvl9pPr marL="3885034" indent="-228531" algn="l" defTabSz="457063" rtl="0" eaLnBrk="1" latinLnBrk="0" hangingPunct="1">
+              <a:spcBef>
+                <a:spcPts val="1000"/>
+              </a:spcBef>
+              <a:spcAft>
+                <a:spcPts val="0"/>
+              </a:spcAft>
+              <a:buClr>
+                <a:schemeClr val="bg2">
+                  <a:lumMod val="40000"/>
+                  <a:lumOff val="60000"/>
+                </a:schemeClr>
+              </a:buClr>
+              <a:buSzPct val="80000"/>
+              <a:buFont typeface="Wingdings 3" charset="2"/>
+              <a:buChar char=""/>
+              <a:defRPr sz="1200" b="0" i="0" kern="1200">
+                <a:solidFill>
+                  <a:schemeClr val="tx1"/>
+                </a:solidFill>
+                <a:latin typeface="+mj-lt"/>
+                <a:ea typeface="+mj-ea"/>
+                <a:cs typeface="+mj-cs"/>
+              </a:defRPr>
+            </a:lvl9pPr>
+          </a:lstStyle>
+          <a:p>
+            <a:endParaRPr lang="es-ES" dirty="0"/>
           </a:p>
         </p:txBody>
       </p:sp>
@@ -11682,13 +12633,13 @@
   <p:clrMapOvr>
     <a:masterClrMapping/>
   </p:clrMapOvr>
-  <mc:AlternateContent xmlns:mc="http://schemas.openxmlformats.org/markup-compatibility/2006">
-    <mc:Choice xmlns:p14="http://schemas.microsoft.com/office/powerpoint/2010/main" Requires="p14">
+  <mc:AlternateContent xmlns:mc="http://schemas.openxmlformats.org/markup-compatibility/2006" xmlns:p14="http://schemas.microsoft.com/office/powerpoint/2010/main">
+    <mc:Choice Requires="p14">
       <p:transition spd="med" p14:dur="700">
         <p:fade/>
       </p:transition>
     </mc:Choice>
-    <mc:Fallback>
+    <mc:Fallback xmlns="">
       <p:transition spd="med">
         <p:fade/>
       </p:transition>
@@ -12067,13 +13018,13 @@
   <p:clrMapOvr>
     <a:masterClrMapping/>
   </p:clrMapOvr>
-  <mc:AlternateContent xmlns:mc="http://schemas.openxmlformats.org/markup-compatibility/2006">
-    <mc:Choice xmlns:p14="http://schemas.microsoft.com/office/powerpoint/2010/main" Requires="p14">
+  <mc:AlternateContent xmlns:mc="http://schemas.openxmlformats.org/markup-compatibility/2006" xmlns:p14="http://schemas.microsoft.com/office/powerpoint/2010/main">
+    <mc:Choice Requires="p14">
       <p:transition spd="med" p14:dur="700">
         <p:fade/>
       </p:transition>
     </mc:Choice>
-    <mc:Fallback>
+    <mc:Fallback xmlns="">
       <p:transition spd="med">
         <p:fade/>
       </p:transition>
@@ -12349,7 +13300,7 @@
   <a:extraClrSchemeLst/>
   <a:extLst>
     <a:ext uri="{05A4C25C-085E-4340-85A3-A5531E510DB2}">
-      <thm15:themeFamily xmlns:thm15="http://schemas.microsoft.com/office/thememl/2012/main" name="Ion" id="{B8441ADB-2E43-4AF7-B97A-BD870242C6A8}" vid="{292E63A9-BB86-4E3D-B92A-7223C6510D2E}"/>
+      <thm15:themeFamily xmlns:thm15="http://schemas.microsoft.com/office/thememl/2012/main" xmlns="" name="Ion" id="{B8441ADB-2E43-4AF7-B97A-BD870242C6A8}" vid="{292E63A9-BB86-4E3D-B92A-7223C6510D2E}"/>
     </a:ext>
   </a:extLst>
 </a:theme>

</xml_diff>